<commit_message>
vault backup: 2026-02-17 15:04:40
</commit_message>
<xml_diff>
--- a/05_Output/Projects/@Active/NTTDX-Customer-Expansion-Mission/02-materials/FY2026-自治体生成AI案件-フェーズ別見通し.pptx
+++ b/05_Output/Projects/@Active/NTTDX-Customer-Expansion-Mission/02-materials/FY2026-自治体生成AI案件-フェーズ別見通し.pptx
@@ -10780,7 +10780,7 @@
         <p:spPr>
           <a:xfrm>
             <a:off x="365760" y="3566160"/>
-            <a:ext cx="3657600" cy="274320"/>
+            <a:ext cx="5486400" cy="274320"/>
           </a:xfrm>
           <a:prstGeom prst="rect">
             <a:avLst/>
@@ -10804,7 +10804,7 @@
                 <a:ea typeface="Meiryo UI" pitchFamily="34" charset="-122"/>
                 <a:cs typeface="Meiryo UI" pitchFamily="34" charset="-120"/>
               </a:rPr>
-              <a:t>落札金額（金額判明分のみ）</a:t>
+              <a:t>落札金額 合計（カッコ内は金額判明件数）</a:t>
             </a:r>
             <a:endParaRPr lang="en-US" sz="1300" dirty="0"/>
           </a:p>
@@ -11394,7 +11394,7 @@
                         <a:buNone/>
                       </a:pPr>
                       <a:r>
-                        <a:rPr lang="en-US" sz="1000" dirty="0">
+                        <a:rPr lang="en-US" sz="900" dirty="0">
                           <a:solidFill>
                             <a:srgbClr val="333333"/>
                           </a:solidFill>
@@ -11404,62 +11404,18 @@
                         </a:rPr>
                         <a:t>10万</a:t>
                       </a:r>
-                      <a:endParaRPr lang="en-US" sz="1000" dirty="0">
-                        <a:latin typeface="Meiryo UI" charset="0"/>
-                        <a:ea typeface="Meiryo UI" charset="0"/>
-                        <a:cs typeface="Meiryo UI" charset="0"/>
-                      </a:endParaRPr>
-                    </a:p>
-                  </a:txBody>
-                  <a:tcPr marL="91440" marR="91440" marT="45720" marB="45720" anchor="ctr">
-                    <a:lnL w="6350" cap="flat" cmpd="sng" algn="ctr">
-                      <a:solidFill>
-                        <a:srgbClr val="E0E0E0"/>
-                      </a:solidFill>
-                      <a:prstDash val="solid"/>
-                      <a:round/>
-                      <a:headEnd type="none" w="med" len="med"/>
-                      <a:tailEnd type="none" w="med" len="med"/>
-                    </a:lnL>
-                    <a:lnR w="6350" cap="flat" cmpd="sng" algn="ctr">
-                      <a:solidFill>
-                        <a:srgbClr val="E0E0E0"/>
-                      </a:solidFill>
-                      <a:prstDash val="solid"/>
-                      <a:round/>
-                      <a:headEnd type="none" w="med" len="med"/>
-                      <a:tailEnd type="none" w="med" len="med"/>
-                    </a:lnR>
-                    <a:lnT w="6350" cap="flat" cmpd="sng" algn="ctr">
-                      <a:solidFill>
-                        <a:srgbClr val="E0E0E0"/>
-                      </a:solidFill>
-                      <a:prstDash val="solid"/>
-                      <a:round/>
-                      <a:headEnd type="none" w="med" len="med"/>
-                      <a:tailEnd type="none" w="med" len="med"/>
-                    </a:lnT>
-                    <a:lnB w="6350" cap="flat" cmpd="sng" algn="ctr">
-                      <a:solidFill>
-                        <a:srgbClr val="E0E0E0"/>
-                      </a:solidFill>
-                      <a:prstDash val="solid"/>
-                      <a:round/>
-                      <a:headEnd type="none" w="med" len="med"/>
-                      <a:tailEnd type="none" w="med" len="med"/>
-                    </a:lnB>
-                  </a:tcPr>
-                </a:tc>
-                <a:tc>
-                  <a:txBody>
-                    <a:bodyPr/>
-                    <a:lstStyle/>
-                    <a:p>
-                      <a:pPr algn="ctr" indent="0" marL="0">
-                        <a:buNone/>
-                      </a:pPr>
-                      <a:r>
-                        <a:rPr lang="en-US" sz="1000" dirty="0">
+                      <a:endParaRPr lang="en-US" sz="900" dirty="0">
+                        <a:latin typeface="Meiryo UI" charset="0"/>
+                        <a:ea typeface="Meiryo UI" charset="0"/>
+                        <a:cs typeface="Meiryo UI" charset="0"/>
+                      </a:endParaRPr>
+                    </a:p>
+                    <a:p>
+                      <a:pPr algn="ctr" indent="0" marL="0">
+                        <a:buNone/>
+                      </a:pPr>
+                      <a:r>
+                        <a:rPr lang="en-US" sz="900" dirty="0">
                           <a:solidFill>
                             <a:srgbClr val="333333"/>
                           </a:solidFill>
@@ -11467,64 +11423,85 @@
                           <a:ea typeface="Meiryo UI" pitchFamily="34" charset="-122"/>
                           <a:cs typeface="Meiryo UI" pitchFamily="34" charset="-120"/>
                         </a:rPr>
+                        <a:t>(1/4件)</a:t>
+                      </a:r>
+                      <a:endParaRPr lang="en-US" sz="900" dirty="0">
+                        <a:latin typeface="Meiryo UI" charset="0"/>
+                        <a:ea typeface="Meiryo UI" charset="0"/>
+                        <a:cs typeface="Meiryo UI" charset="0"/>
+                      </a:endParaRPr>
+                    </a:p>
+                  </a:txBody>
+                  <a:tcPr marL="91440" marR="91440" marT="45720" marB="45720" anchor="ctr">
+                    <a:lnL w="6350" cap="flat" cmpd="sng" algn="ctr">
+                      <a:solidFill>
+                        <a:srgbClr val="E0E0E0"/>
+                      </a:solidFill>
+                      <a:prstDash val="solid"/>
+                      <a:round/>
+                      <a:headEnd type="none" w="med" len="med"/>
+                      <a:tailEnd type="none" w="med" len="med"/>
+                    </a:lnL>
+                    <a:lnR w="6350" cap="flat" cmpd="sng" algn="ctr">
+                      <a:solidFill>
+                        <a:srgbClr val="E0E0E0"/>
+                      </a:solidFill>
+                      <a:prstDash val="solid"/>
+                      <a:round/>
+                      <a:headEnd type="none" w="med" len="med"/>
+                      <a:tailEnd type="none" w="med" len="med"/>
+                    </a:lnR>
+                    <a:lnT w="6350" cap="flat" cmpd="sng" algn="ctr">
+                      <a:solidFill>
+                        <a:srgbClr val="E0E0E0"/>
+                      </a:solidFill>
+                      <a:prstDash val="solid"/>
+                      <a:round/>
+                      <a:headEnd type="none" w="med" len="med"/>
+                      <a:tailEnd type="none" w="med" len="med"/>
+                    </a:lnT>
+                    <a:lnB w="6350" cap="flat" cmpd="sng" algn="ctr">
+                      <a:solidFill>
+                        <a:srgbClr val="E0E0E0"/>
+                      </a:solidFill>
+                      <a:prstDash val="solid"/>
+                      <a:round/>
+                      <a:headEnd type="none" w="med" len="med"/>
+                      <a:tailEnd type="none" w="med" len="med"/>
+                    </a:lnB>
+                  </a:tcPr>
+                </a:tc>
+                <a:tc>
+                  <a:txBody>
+                    <a:bodyPr/>
+                    <a:lstStyle/>
+                    <a:p>
+                      <a:pPr algn="ctr" indent="0" marL="0">
+                        <a:buNone/>
+                      </a:pPr>
+                      <a:r>
+                        <a:rPr lang="en-US" sz="900" dirty="0">
+                          <a:solidFill>
+                            <a:srgbClr val="333333"/>
+                          </a:solidFill>
+                          <a:latin typeface="Meiryo UI" pitchFamily="34" charset="0"/>
+                          <a:ea typeface="Meiryo UI" pitchFamily="34" charset="-122"/>
+                          <a:cs typeface="Meiryo UI" pitchFamily="34" charset="-120"/>
+                        </a:rPr>
                         <a:t>-</a:t>
                       </a:r>
-                      <a:endParaRPr lang="en-US" sz="1000" dirty="0">
-                        <a:latin typeface="Meiryo UI" charset="0"/>
-                        <a:ea typeface="Meiryo UI" charset="0"/>
-                        <a:cs typeface="Meiryo UI" charset="0"/>
-                      </a:endParaRPr>
-                    </a:p>
-                  </a:txBody>
-                  <a:tcPr marL="91440" marR="91440" marT="45720" marB="45720" anchor="ctr">
-                    <a:lnL w="6350" cap="flat" cmpd="sng" algn="ctr">
-                      <a:solidFill>
-                        <a:srgbClr val="E0E0E0"/>
-                      </a:solidFill>
-                      <a:prstDash val="solid"/>
-                      <a:round/>
-                      <a:headEnd type="none" w="med" len="med"/>
-                      <a:tailEnd type="none" w="med" len="med"/>
-                    </a:lnL>
-                    <a:lnR w="6350" cap="flat" cmpd="sng" algn="ctr">
-                      <a:solidFill>
-                        <a:srgbClr val="E0E0E0"/>
-                      </a:solidFill>
-                      <a:prstDash val="solid"/>
-                      <a:round/>
-                      <a:headEnd type="none" w="med" len="med"/>
-                      <a:tailEnd type="none" w="med" len="med"/>
-                    </a:lnR>
-                    <a:lnT w="6350" cap="flat" cmpd="sng" algn="ctr">
-                      <a:solidFill>
-                        <a:srgbClr val="E0E0E0"/>
-                      </a:solidFill>
-                      <a:prstDash val="solid"/>
-                      <a:round/>
-                      <a:headEnd type="none" w="med" len="med"/>
-                      <a:tailEnd type="none" w="med" len="med"/>
-                    </a:lnT>
-                    <a:lnB w="6350" cap="flat" cmpd="sng" algn="ctr">
-                      <a:solidFill>
-                        <a:srgbClr val="E0E0E0"/>
-                      </a:solidFill>
-                      <a:prstDash val="solid"/>
-                      <a:round/>
-                      <a:headEnd type="none" w="med" len="med"/>
-                      <a:tailEnd type="none" w="med" len="med"/>
-                    </a:lnB>
-                  </a:tcPr>
-                </a:tc>
-                <a:tc>
-                  <a:txBody>
-                    <a:bodyPr/>
-                    <a:lstStyle/>
-                    <a:p>
-                      <a:pPr algn="ctr" indent="0" marL="0">
-                        <a:buNone/>
-                      </a:pPr>
-                      <a:r>
-                        <a:rPr lang="en-US" sz="1000" dirty="0">
+                      <a:endParaRPr lang="en-US" sz="900" dirty="0">
+                        <a:latin typeface="Meiryo UI" charset="0"/>
+                        <a:ea typeface="Meiryo UI" charset="0"/>
+                        <a:cs typeface="Meiryo UI" charset="0"/>
+                      </a:endParaRPr>
+                    </a:p>
+                    <a:p>
+                      <a:pPr algn="ctr" indent="0" marL="0">
+                        <a:buNone/>
+                      </a:pPr>
+                      <a:r>
+                        <a:rPr lang="en-US" sz="900" dirty="0">
                           <a:solidFill>
                             <a:srgbClr val="333333"/>
                           </a:solidFill>
@@ -11532,64 +11509,85 @@
                           <a:ea typeface="Meiryo UI" pitchFamily="34" charset="-122"/>
                           <a:cs typeface="Meiryo UI" pitchFamily="34" charset="-120"/>
                         </a:rPr>
+                        <a:t>(0/6件)</a:t>
+                      </a:r>
+                      <a:endParaRPr lang="en-US" sz="900" dirty="0">
+                        <a:latin typeface="Meiryo UI" charset="0"/>
+                        <a:ea typeface="Meiryo UI" charset="0"/>
+                        <a:cs typeface="Meiryo UI" charset="0"/>
+                      </a:endParaRPr>
+                    </a:p>
+                  </a:txBody>
+                  <a:tcPr marL="91440" marR="91440" marT="45720" marB="45720" anchor="ctr">
+                    <a:lnL w="6350" cap="flat" cmpd="sng" algn="ctr">
+                      <a:solidFill>
+                        <a:srgbClr val="E0E0E0"/>
+                      </a:solidFill>
+                      <a:prstDash val="solid"/>
+                      <a:round/>
+                      <a:headEnd type="none" w="med" len="med"/>
+                      <a:tailEnd type="none" w="med" len="med"/>
+                    </a:lnL>
+                    <a:lnR w="6350" cap="flat" cmpd="sng" algn="ctr">
+                      <a:solidFill>
+                        <a:srgbClr val="E0E0E0"/>
+                      </a:solidFill>
+                      <a:prstDash val="solid"/>
+                      <a:round/>
+                      <a:headEnd type="none" w="med" len="med"/>
+                      <a:tailEnd type="none" w="med" len="med"/>
+                    </a:lnR>
+                    <a:lnT w="6350" cap="flat" cmpd="sng" algn="ctr">
+                      <a:solidFill>
+                        <a:srgbClr val="E0E0E0"/>
+                      </a:solidFill>
+                      <a:prstDash val="solid"/>
+                      <a:round/>
+                      <a:headEnd type="none" w="med" len="med"/>
+                      <a:tailEnd type="none" w="med" len="med"/>
+                    </a:lnT>
+                    <a:lnB w="6350" cap="flat" cmpd="sng" algn="ctr">
+                      <a:solidFill>
+                        <a:srgbClr val="E0E0E0"/>
+                      </a:solidFill>
+                      <a:prstDash val="solid"/>
+                      <a:round/>
+                      <a:headEnd type="none" w="med" len="med"/>
+                      <a:tailEnd type="none" w="med" len="med"/>
+                    </a:lnB>
+                  </a:tcPr>
+                </a:tc>
+                <a:tc>
+                  <a:txBody>
+                    <a:bodyPr/>
+                    <a:lstStyle/>
+                    <a:p>
+                      <a:pPr algn="ctr" indent="0" marL="0">
+                        <a:buNone/>
+                      </a:pPr>
+                      <a:r>
+                        <a:rPr lang="en-US" sz="900" dirty="0">
+                          <a:solidFill>
+                            <a:srgbClr val="333333"/>
+                          </a:solidFill>
+                          <a:latin typeface="Meiryo UI" pitchFamily="34" charset="0"/>
+                          <a:ea typeface="Meiryo UI" pitchFamily="34" charset="-122"/>
+                          <a:cs typeface="Meiryo UI" pitchFamily="34" charset="-120"/>
+                        </a:rPr>
                         <a:t>3,173万</a:t>
                       </a:r>
-                      <a:endParaRPr lang="en-US" sz="1000" dirty="0">
-                        <a:latin typeface="Meiryo UI" charset="0"/>
-                        <a:ea typeface="Meiryo UI" charset="0"/>
-                        <a:cs typeface="Meiryo UI" charset="0"/>
-                      </a:endParaRPr>
-                    </a:p>
-                  </a:txBody>
-                  <a:tcPr marL="91440" marR="91440" marT="45720" marB="45720" anchor="ctr">
-                    <a:lnL w="6350" cap="flat" cmpd="sng" algn="ctr">
-                      <a:solidFill>
-                        <a:srgbClr val="E0E0E0"/>
-                      </a:solidFill>
-                      <a:prstDash val="solid"/>
-                      <a:round/>
-                      <a:headEnd type="none" w="med" len="med"/>
-                      <a:tailEnd type="none" w="med" len="med"/>
-                    </a:lnL>
-                    <a:lnR w="6350" cap="flat" cmpd="sng" algn="ctr">
-                      <a:solidFill>
-                        <a:srgbClr val="E0E0E0"/>
-                      </a:solidFill>
-                      <a:prstDash val="solid"/>
-                      <a:round/>
-                      <a:headEnd type="none" w="med" len="med"/>
-                      <a:tailEnd type="none" w="med" len="med"/>
-                    </a:lnR>
-                    <a:lnT w="6350" cap="flat" cmpd="sng" algn="ctr">
-                      <a:solidFill>
-                        <a:srgbClr val="E0E0E0"/>
-                      </a:solidFill>
-                      <a:prstDash val="solid"/>
-                      <a:round/>
-                      <a:headEnd type="none" w="med" len="med"/>
-                      <a:tailEnd type="none" w="med" len="med"/>
-                    </a:lnT>
-                    <a:lnB w="6350" cap="flat" cmpd="sng" algn="ctr">
-                      <a:solidFill>
-                        <a:srgbClr val="E0E0E0"/>
-                      </a:solidFill>
-                      <a:prstDash val="solid"/>
-                      <a:round/>
-                      <a:headEnd type="none" w="med" len="med"/>
-                      <a:tailEnd type="none" w="med" len="med"/>
-                    </a:lnB>
-                  </a:tcPr>
-                </a:tc>
-                <a:tc>
-                  <a:txBody>
-                    <a:bodyPr/>
-                    <a:lstStyle/>
-                    <a:p>
-                      <a:pPr algn="ctr" indent="0" marL="0">
-                        <a:buNone/>
-                      </a:pPr>
-                      <a:r>
-                        <a:rPr lang="en-US" sz="1000" dirty="0">
+                      <a:endParaRPr lang="en-US" sz="900" dirty="0">
+                        <a:latin typeface="Meiryo UI" charset="0"/>
+                        <a:ea typeface="Meiryo UI" charset="0"/>
+                        <a:cs typeface="Meiryo UI" charset="0"/>
+                      </a:endParaRPr>
+                    </a:p>
+                    <a:p>
+                      <a:pPr algn="ctr" indent="0" marL="0">
+                        <a:buNone/>
+                      </a:pPr>
+                      <a:r>
+                        <a:rPr lang="en-US" sz="900" dirty="0">
                           <a:solidFill>
                             <a:srgbClr val="333333"/>
                           </a:solidFill>
@@ -11597,64 +11595,85 @@
                           <a:ea typeface="Meiryo UI" pitchFamily="34" charset="-122"/>
                           <a:cs typeface="Meiryo UI" pitchFamily="34" charset="-120"/>
                         </a:rPr>
+                        <a:t>(5/6件)</a:t>
+                      </a:r>
+                      <a:endParaRPr lang="en-US" sz="900" dirty="0">
+                        <a:latin typeface="Meiryo UI" charset="0"/>
+                        <a:ea typeface="Meiryo UI" charset="0"/>
+                        <a:cs typeface="Meiryo UI" charset="0"/>
+                      </a:endParaRPr>
+                    </a:p>
+                  </a:txBody>
+                  <a:tcPr marL="91440" marR="91440" marT="45720" marB="45720" anchor="ctr">
+                    <a:lnL w="6350" cap="flat" cmpd="sng" algn="ctr">
+                      <a:solidFill>
+                        <a:srgbClr val="E0E0E0"/>
+                      </a:solidFill>
+                      <a:prstDash val="solid"/>
+                      <a:round/>
+                      <a:headEnd type="none" w="med" len="med"/>
+                      <a:tailEnd type="none" w="med" len="med"/>
+                    </a:lnL>
+                    <a:lnR w="6350" cap="flat" cmpd="sng" algn="ctr">
+                      <a:solidFill>
+                        <a:srgbClr val="E0E0E0"/>
+                      </a:solidFill>
+                      <a:prstDash val="solid"/>
+                      <a:round/>
+                      <a:headEnd type="none" w="med" len="med"/>
+                      <a:tailEnd type="none" w="med" len="med"/>
+                    </a:lnR>
+                    <a:lnT w="6350" cap="flat" cmpd="sng" algn="ctr">
+                      <a:solidFill>
+                        <a:srgbClr val="E0E0E0"/>
+                      </a:solidFill>
+                      <a:prstDash val="solid"/>
+                      <a:round/>
+                      <a:headEnd type="none" w="med" len="med"/>
+                      <a:tailEnd type="none" w="med" len="med"/>
+                    </a:lnT>
+                    <a:lnB w="6350" cap="flat" cmpd="sng" algn="ctr">
+                      <a:solidFill>
+                        <a:srgbClr val="E0E0E0"/>
+                      </a:solidFill>
+                      <a:prstDash val="solid"/>
+                      <a:round/>
+                      <a:headEnd type="none" w="med" len="med"/>
+                      <a:tailEnd type="none" w="med" len="med"/>
+                    </a:lnB>
+                  </a:tcPr>
+                </a:tc>
+                <a:tc>
+                  <a:txBody>
+                    <a:bodyPr/>
+                    <a:lstStyle/>
+                    <a:p>
+                      <a:pPr algn="ctr" indent="0" marL="0">
+                        <a:buNone/>
+                      </a:pPr>
+                      <a:r>
+                        <a:rPr lang="en-US" sz="900" dirty="0">
+                          <a:solidFill>
+                            <a:srgbClr val="333333"/>
+                          </a:solidFill>
+                          <a:latin typeface="Meiryo UI" pitchFamily="34" charset="0"/>
+                          <a:ea typeface="Meiryo UI" pitchFamily="34" charset="-122"/>
+                          <a:cs typeface="Meiryo UI" pitchFamily="34" charset="-120"/>
+                        </a:rPr>
                         <a:t>3.7億</a:t>
                       </a:r>
-                      <a:endParaRPr lang="en-US" sz="1000" dirty="0">
-                        <a:latin typeface="Meiryo UI" charset="0"/>
-                        <a:ea typeface="Meiryo UI" charset="0"/>
-                        <a:cs typeface="Meiryo UI" charset="0"/>
-                      </a:endParaRPr>
-                    </a:p>
-                  </a:txBody>
-                  <a:tcPr marL="91440" marR="91440" marT="45720" marB="45720" anchor="ctr">
-                    <a:lnL w="6350" cap="flat" cmpd="sng" algn="ctr">
-                      <a:solidFill>
-                        <a:srgbClr val="E0E0E0"/>
-                      </a:solidFill>
-                      <a:prstDash val="solid"/>
-                      <a:round/>
-                      <a:headEnd type="none" w="med" len="med"/>
-                      <a:tailEnd type="none" w="med" len="med"/>
-                    </a:lnL>
-                    <a:lnR w="6350" cap="flat" cmpd="sng" algn="ctr">
-                      <a:solidFill>
-                        <a:srgbClr val="E0E0E0"/>
-                      </a:solidFill>
-                      <a:prstDash val="solid"/>
-                      <a:round/>
-                      <a:headEnd type="none" w="med" len="med"/>
-                      <a:tailEnd type="none" w="med" len="med"/>
-                    </a:lnR>
-                    <a:lnT w="6350" cap="flat" cmpd="sng" algn="ctr">
-                      <a:solidFill>
-                        <a:srgbClr val="E0E0E0"/>
-                      </a:solidFill>
-                      <a:prstDash val="solid"/>
-                      <a:round/>
-                      <a:headEnd type="none" w="med" len="med"/>
-                      <a:tailEnd type="none" w="med" len="med"/>
-                    </a:lnT>
-                    <a:lnB w="6350" cap="flat" cmpd="sng" algn="ctr">
-                      <a:solidFill>
-                        <a:srgbClr val="E0E0E0"/>
-                      </a:solidFill>
-                      <a:prstDash val="solid"/>
-                      <a:round/>
-                      <a:headEnd type="none" w="med" len="med"/>
-                      <a:tailEnd type="none" w="med" len="med"/>
-                    </a:lnB>
-                  </a:tcPr>
-                </a:tc>
-                <a:tc>
-                  <a:txBody>
-                    <a:bodyPr/>
-                    <a:lstStyle/>
-                    <a:p>
-                      <a:pPr algn="ctr" indent="0" marL="0">
-                        <a:buNone/>
-                      </a:pPr>
-                      <a:r>
-                        <a:rPr lang="en-US" sz="1000" dirty="0">
+                      <a:endParaRPr lang="en-US" sz="900" dirty="0">
+                        <a:latin typeface="Meiryo UI" charset="0"/>
+                        <a:ea typeface="Meiryo UI" charset="0"/>
+                        <a:cs typeface="Meiryo UI" charset="0"/>
+                      </a:endParaRPr>
+                    </a:p>
+                    <a:p>
+                      <a:pPr algn="ctr" indent="0" marL="0">
+                        <a:buNone/>
+                      </a:pPr>
+                      <a:r>
+                        <a:rPr lang="en-US" sz="900" dirty="0">
                           <a:solidFill>
                             <a:srgbClr val="333333"/>
                           </a:solidFill>
@@ -11662,64 +11681,150 @@
                           <a:ea typeface="Meiryo UI" pitchFamily="34" charset="-122"/>
                           <a:cs typeface="Meiryo UI" pitchFamily="34" charset="-120"/>
                         </a:rPr>
+                        <a:t>(40/72件)</a:t>
+                      </a:r>
+                      <a:endParaRPr lang="en-US" sz="900" dirty="0">
+                        <a:latin typeface="Meiryo UI" charset="0"/>
+                        <a:ea typeface="Meiryo UI" charset="0"/>
+                        <a:cs typeface="Meiryo UI" charset="0"/>
+                      </a:endParaRPr>
+                    </a:p>
+                  </a:txBody>
+                  <a:tcPr marL="91440" marR="91440" marT="45720" marB="45720" anchor="ctr">
+                    <a:lnL w="6350" cap="flat" cmpd="sng" algn="ctr">
+                      <a:solidFill>
+                        <a:srgbClr val="E0E0E0"/>
+                      </a:solidFill>
+                      <a:prstDash val="solid"/>
+                      <a:round/>
+                      <a:headEnd type="none" w="med" len="med"/>
+                      <a:tailEnd type="none" w="med" len="med"/>
+                    </a:lnL>
+                    <a:lnR w="6350" cap="flat" cmpd="sng" algn="ctr">
+                      <a:solidFill>
+                        <a:srgbClr val="E0E0E0"/>
+                      </a:solidFill>
+                      <a:prstDash val="solid"/>
+                      <a:round/>
+                      <a:headEnd type="none" w="med" len="med"/>
+                      <a:tailEnd type="none" w="med" len="med"/>
+                    </a:lnR>
+                    <a:lnT w="6350" cap="flat" cmpd="sng" algn="ctr">
+                      <a:solidFill>
+                        <a:srgbClr val="E0E0E0"/>
+                      </a:solidFill>
+                      <a:prstDash val="solid"/>
+                      <a:round/>
+                      <a:headEnd type="none" w="med" len="med"/>
+                      <a:tailEnd type="none" w="med" len="med"/>
+                    </a:lnT>
+                    <a:lnB w="6350" cap="flat" cmpd="sng" algn="ctr">
+                      <a:solidFill>
+                        <a:srgbClr val="E0E0E0"/>
+                      </a:solidFill>
+                      <a:prstDash val="solid"/>
+                      <a:round/>
+                      <a:headEnd type="none" w="med" len="med"/>
+                      <a:tailEnd type="none" w="med" len="med"/>
+                    </a:lnB>
+                  </a:tcPr>
+                </a:tc>
+                <a:tc>
+                  <a:txBody>
+                    <a:bodyPr/>
+                    <a:lstStyle/>
+                    <a:p>
+                      <a:pPr algn="ctr" indent="0" marL="0">
+                        <a:buNone/>
+                      </a:pPr>
+                      <a:r>
+                        <a:rPr lang="en-US" sz="900" dirty="0">
+                          <a:solidFill>
+                            <a:srgbClr val="333333"/>
+                          </a:solidFill>
+                          <a:latin typeface="Meiryo UI" pitchFamily="34" charset="0"/>
+                          <a:ea typeface="Meiryo UI" pitchFamily="34" charset="-122"/>
+                          <a:cs typeface="Meiryo UI" pitchFamily="34" charset="-120"/>
+                        </a:rPr>
                         <a:t>2.4億</a:t>
                       </a:r>
-                      <a:endParaRPr lang="en-US" sz="1000" dirty="0">
-                        <a:latin typeface="Meiryo UI" charset="0"/>
-                        <a:ea typeface="Meiryo UI" charset="0"/>
-                        <a:cs typeface="Meiryo UI" charset="0"/>
-                      </a:endParaRPr>
-                    </a:p>
-                  </a:txBody>
-                  <a:tcPr marL="91440" marR="91440" marT="45720" marB="45720" anchor="ctr">
-                    <a:lnL w="6350" cap="flat" cmpd="sng" algn="ctr">
-                      <a:solidFill>
-                        <a:srgbClr val="E0E0E0"/>
-                      </a:solidFill>
-                      <a:prstDash val="solid"/>
-                      <a:round/>
-                      <a:headEnd type="none" w="med" len="med"/>
-                      <a:tailEnd type="none" w="med" len="med"/>
-                    </a:lnL>
-                    <a:lnR w="6350" cap="flat" cmpd="sng" algn="ctr">
-                      <a:solidFill>
-                        <a:srgbClr val="E0E0E0"/>
-                      </a:solidFill>
-                      <a:prstDash val="solid"/>
-                      <a:round/>
-                      <a:headEnd type="none" w="med" len="med"/>
-                      <a:tailEnd type="none" w="med" len="med"/>
-                    </a:lnR>
-                    <a:lnT w="6350" cap="flat" cmpd="sng" algn="ctr">
-                      <a:solidFill>
-                        <a:srgbClr val="E0E0E0"/>
-                      </a:solidFill>
-                      <a:prstDash val="solid"/>
-                      <a:round/>
-                      <a:headEnd type="none" w="med" len="med"/>
-                      <a:tailEnd type="none" w="med" len="med"/>
-                    </a:lnT>
-                    <a:lnB w="6350" cap="flat" cmpd="sng" algn="ctr">
-                      <a:solidFill>
-                        <a:srgbClr val="E0E0E0"/>
-                      </a:solidFill>
-                      <a:prstDash val="solid"/>
-                      <a:round/>
-                      <a:headEnd type="none" w="med" len="med"/>
-                      <a:tailEnd type="none" w="med" len="med"/>
-                    </a:lnB>
-                  </a:tcPr>
-                </a:tc>
-                <a:tc>
-                  <a:txBody>
-                    <a:bodyPr/>
-                    <a:lstStyle/>
-                    <a:p>
-                      <a:pPr algn="ctr" indent="0" marL="0">
-                        <a:buNone/>
-                      </a:pPr>
-                      <a:r>
-                        <a:rPr lang="en-US" sz="1000" b="1" dirty="0">
+                      <a:endParaRPr lang="en-US" sz="900" dirty="0">
+                        <a:latin typeface="Meiryo UI" charset="0"/>
+                        <a:ea typeface="Meiryo UI" charset="0"/>
+                        <a:cs typeface="Meiryo UI" charset="0"/>
+                      </a:endParaRPr>
+                    </a:p>
+                    <a:p>
+                      <a:pPr algn="ctr" indent="0" marL="0">
+                        <a:buNone/>
+                      </a:pPr>
+                      <a:r>
+                        <a:rPr lang="en-US" sz="900" dirty="0">
+                          <a:solidFill>
+                            <a:srgbClr val="333333"/>
+                          </a:solidFill>
+                          <a:latin typeface="Meiryo UI" pitchFamily="34" charset="0"/>
+                          <a:ea typeface="Meiryo UI" pitchFamily="34" charset="-122"/>
+                          <a:cs typeface="Meiryo UI" pitchFamily="34" charset="-120"/>
+                        </a:rPr>
+                        <a:t>(25/42件)</a:t>
+                      </a:r>
+                      <a:endParaRPr lang="en-US" sz="900" dirty="0">
+                        <a:latin typeface="Meiryo UI" charset="0"/>
+                        <a:ea typeface="Meiryo UI" charset="0"/>
+                        <a:cs typeface="Meiryo UI" charset="0"/>
+                      </a:endParaRPr>
+                    </a:p>
+                  </a:txBody>
+                  <a:tcPr marL="91440" marR="91440" marT="45720" marB="45720" anchor="ctr">
+                    <a:lnL w="6350" cap="flat" cmpd="sng" algn="ctr">
+                      <a:solidFill>
+                        <a:srgbClr val="E0E0E0"/>
+                      </a:solidFill>
+                      <a:prstDash val="solid"/>
+                      <a:round/>
+                      <a:headEnd type="none" w="med" len="med"/>
+                      <a:tailEnd type="none" w="med" len="med"/>
+                    </a:lnL>
+                    <a:lnR w="6350" cap="flat" cmpd="sng" algn="ctr">
+                      <a:solidFill>
+                        <a:srgbClr val="E0E0E0"/>
+                      </a:solidFill>
+                      <a:prstDash val="solid"/>
+                      <a:round/>
+                      <a:headEnd type="none" w="med" len="med"/>
+                      <a:tailEnd type="none" w="med" len="med"/>
+                    </a:lnR>
+                    <a:lnT w="6350" cap="flat" cmpd="sng" algn="ctr">
+                      <a:solidFill>
+                        <a:srgbClr val="E0E0E0"/>
+                      </a:solidFill>
+                      <a:prstDash val="solid"/>
+                      <a:round/>
+                      <a:headEnd type="none" w="med" len="med"/>
+                      <a:tailEnd type="none" w="med" len="med"/>
+                    </a:lnT>
+                    <a:lnB w="6350" cap="flat" cmpd="sng" algn="ctr">
+                      <a:solidFill>
+                        <a:srgbClr val="E0E0E0"/>
+                      </a:solidFill>
+                      <a:prstDash val="solid"/>
+                      <a:round/>
+                      <a:headEnd type="none" w="med" len="med"/>
+                      <a:tailEnd type="none" w="med" len="med"/>
+                    </a:lnB>
+                  </a:tcPr>
+                </a:tc>
+                <a:tc>
+                  <a:txBody>
+                    <a:bodyPr/>
+                    <a:lstStyle/>
+                    <a:p>
+                      <a:pPr algn="ctr" indent="0" marL="0">
+                        <a:buNone/>
+                      </a:pPr>
+                      <a:r>
+                        <a:rPr lang="en-US" sz="900" b="1" dirty="0">
                           <a:solidFill>
                             <a:srgbClr val="156082"/>
                           </a:solidFill>
@@ -11729,7 +11834,28 @@
                         </a:rPr>
                         <a:t>6.4億</a:t>
                       </a:r>
-                      <a:endParaRPr lang="en-US" sz="1000" dirty="0">
+                      <a:endParaRPr lang="en-US" sz="900" dirty="0">
+                        <a:latin typeface="Meiryo UI" charset="0"/>
+                        <a:ea typeface="Meiryo UI" charset="0"/>
+                        <a:cs typeface="Meiryo UI" charset="0"/>
+                      </a:endParaRPr>
+                    </a:p>
+                    <a:p>
+                      <a:pPr algn="ctr" indent="0" marL="0">
+                        <a:buNone/>
+                      </a:pPr>
+                      <a:r>
+                        <a:rPr lang="en-US" sz="900" b="1" dirty="0">
+                          <a:solidFill>
+                            <a:srgbClr val="156082"/>
+                          </a:solidFill>
+                          <a:latin typeface="Meiryo UI" pitchFamily="34" charset="0"/>
+                          <a:ea typeface="Meiryo UI" pitchFamily="34" charset="-122"/>
+                          <a:cs typeface="Meiryo UI" pitchFamily="34" charset="-120"/>
+                        </a:rPr>
+                        <a:t>(71/130件)</a:t>
+                      </a:r>
+                      <a:endParaRPr lang="en-US" sz="900" dirty="0">
                         <a:latin typeface="Meiryo UI" charset="0"/>
                         <a:ea typeface="Meiryo UI" charset="0"/>
                         <a:cs typeface="Meiryo UI" charset="0"/>
@@ -11854,7 +11980,7 @@
                         <a:buNone/>
                       </a:pPr>
                       <a:r>
-                        <a:rPr lang="en-US" sz="1000" dirty="0">
+                        <a:rPr lang="en-US" sz="900" dirty="0">
                           <a:solidFill>
                             <a:srgbClr val="333333"/>
                           </a:solidFill>
@@ -11864,62 +11990,18 @@
                         </a:rPr>
                         <a:t>6,050万</a:t>
                       </a:r>
-                      <a:endParaRPr lang="en-US" sz="1000" dirty="0">
-                        <a:latin typeface="Meiryo UI" charset="0"/>
-                        <a:ea typeface="Meiryo UI" charset="0"/>
-                        <a:cs typeface="Meiryo UI" charset="0"/>
-                      </a:endParaRPr>
-                    </a:p>
-                  </a:txBody>
-                  <a:tcPr marL="91440" marR="91440" marT="45720" marB="45720" anchor="ctr">
-                    <a:lnL w="6350" cap="flat" cmpd="sng" algn="ctr">
-                      <a:solidFill>
-                        <a:srgbClr val="E0E0E0"/>
-                      </a:solidFill>
-                      <a:prstDash val="solid"/>
-                      <a:round/>
-                      <a:headEnd type="none" w="med" len="med"/>
-                      <a:tailEnd type="none" w="med" len="med"/>
-                    </a:lnL>
-                    <a:lnR w="6350" cap="flat" cmpd="sng" algn="ctr">
-                      <a:solidFill>
-                        <a:srgbClr val="E0E0E0"/>
-                      </a:solidFill>
-                      <a:prstDash val="solid"/>
-                      <a:round/>
-                      <a:headEnd type="none" w="med" len="med"/>
-                      <a:tailEnd type="none" w="med" len="med"/>
-                    </a:lnR>
-                    <a:lnT w="6350" cap="flat" cmpd="sng" algn="ctr">
-                      <a:solidFill>
-                        <a:srgbClr val="E0E0E0"/>
-                      </a:solidFill>
-                      <a:prstDash val="solid"/>
-                      <a:round/>
-                      <a:headEnd type="none" w="med" len="med"/>
-                      <a:tailEnd type="none" w="med" len="med"/>
-                    </a:lnT>
-                    <a:lnB w="6350" cap="flat" cmpd="sng" algn="ctr">
-                      <a:solidFill>
-                        <a:srgbClr val="E0E0E0"/>
-                      </a:solidFill>
-                      <a:prstDash val="solid"/>
-                      <a:round/>
-                      <a:headEnd type="none" w="med" len="med"/>
-                      <a:tailEnd type="none" w="med" len="med"/>
-                    </a:lnB>
-                  </a:tcPr>
-                </a:tc>
-                <a:tc>
-                  <a:txBody>
-                    <a:bodyPr/>
-                    <a:lstStyle/>
-                    <a:p>
-                      <a:pPr algn="ctr" indent="0" marL="0">
-                        <a:buNone/>
-                      </a:pPr>
-                      <a:r>
-                        <a:rPr lang="en-US" sz="1000" dirty="0">
+                      <a:endParaRPr lang="en-US" sz="900" dirty="0">
+                        <a:latin typeface="Meiryo UI" charset="0"/>
+                        <a:ea typeface="Meiryo UI" charset="0"/>
+                        <a:cs typeface="Meiryo UI" charset="0"/>
+                      </a:endParaRPr>
+                    </a:p>
+                    <a:p>
+                      <a:pPr algn="ctr" indent="0" marL="0">
+                        <a:buNone/>
+                      </a:pPr>
+                      <a:r>
+                        <a:rPr lang="en-US" sz="900" dirty="0">
                           <a:solidFill>
                             <a:srgbClr val="333333"/>
                           </a:solidFill>
@@ -11927,64 +12009,85 @@
                           <a:ea typeface="Meiryo UI" pitchFamily="34" charset="-122"/>
                           <a:cs typeface="Meiryo UI" pitchFamily="34" charset="-120"/>
                         </a:rPr>
+                        <a:t>(7/15件)</a:t>
+                      </a:r>
+                      <a:endParaRPr lang="en-US" sz="900" dirty="0">
+                        <a:latin typeface="Meiryo UI" charset="0"/>
+                        <a:ea typeface="Meiryo UI" charset="0"/>
+                        <a:cs typeface="Meiryo UI" charset="0"/>
+                      </a:endParaRPr>
+                    </a:p>
+                  </a:txBody>
+                  <a:tcPr marL="91440" marR="91440" marT="45720" marB="45720" anchor="ctr">
+                    <a:lnL w="6350" cap="flat" cmpd="sng" algn="ctr">
+                      <a:solidFill>
+                        <a:srgbClr val="E0E0E0"/>
+                      </a:solidFill>
+                      <a:prstDash val="solid"/>
+                      <a:round/>
+                      <a:headEnd type="none" w="med" len="med"/>
+                      <a:tailEnd type="none" w="med" len="med"/>
+                    </a:lnL>
+                    <a:lnR w="6350" cap="flat" cmpd="sng" algn="ctr">
+                      <a:solidFill>
+                        <a:srgbClr val="E0E0E0"/>
+                      </a:solidFill>
+                      <a:prstDash val="solid"/>
+                      <a:round/>
+                      <a:headEnd type="none" w="med" len="med"/>
+                      <a:tailEnd type="none" w="med" len="med"/>
+                    </a:lnR>
+                    <a:lnT w="6350" cap="flat" cmpd="sng" algn="ctr">
+                      <a:solidFill>
+                        <a:srgbClr val="E0E0E0"/>
+                      </a:solidFill>
+                      <a:prstDash val="solid"/>
+                      <a:round/>
+                      <a:headEnd type="none" w="med" len="med"/>
+                      <a:tailEnd type="none" w="med" len="med"/>
+                    </a:lnT>
+                    <a:lnB w="6350" cap="flat" cmpd="sng" algn="ctr">
+                      <a:solidFill>
+                        <a:srgbClr val="E0E0E0"/>
+                      </a:solidFill>
+                      <a:prstDash val="solid"/>
+                      <a:round/>
+                      <a:headEnd type="none" w="med" len="med"/>
+                      <a:tailEnd type="none" w="med" len="med"/>
+                    </a:lnB>
+                  </a:tcPr>
+                </a:tc>
+                <a:tc>
+                  <a:txBody>
+                    <a:bodyPr/>
+                    <a:lstStyle/>
+                    <a:p>
+                      <a:pPr algn="ctr" indent="0" marL="0">
+                        <a:buNone/>
+                      </a:pPr>
+                      <a:r>
+                        <a:rPr lang="en-US" sz="900" dirty="0">
+                          <a:solidFill>
+                            <a:srgbClr val="333333"/>
+                          </a:solidFill>
+                          <a:latin typeface="Meiryo UI" pitchFamily="34" charset="0"/>
+                          <a:ea typeface="Meiryo UI" pitchFamily="34" charset="-122"/>
+                          <a:cs typeface="Meiryo UI" pitchFamily="34" charset="-120"/>
+                        </a:rPr>
                         <a:t>-</a:t>
                       </a:r>
-                      <a:endParaRPr lang="en-US" sz="1000" dirty="0">
-                        <a:latin typeface="Meiryo UI" charset="0"/>
-                        <a:ea typeface="Meiryo UI" charset="0"/>
-                        <a:cs typeface="Meiryo UI" charset="0"/>
-                      </a:endParaRPr>
-                    </a:p>
-                  </a:txBody>
-                  <a:tcPr marL="91440" marR="91440" marT="45720" marB="45720" anchor="ctr">
-                    <a:lnL w="6350" cap="flat" cmpd="sng" algn="ctr">
-                      <a:solidFill>
-                        <a:srgbClr val="E0E0E0"/>
-                      </a:solidFill>
-                      <a:prstDash val="solid"/>
-                      <a:round/>
-                      <a:headEnd type="none" w="med" len="med"/>
-                      <a:tailEnd type="none" w="med" len="med"/>
-                    </a:lnL>
-                    <a:lnR w="6350" cap="flat" cmpd="sng" algn="ctr">
-                      <a:solidFill>
-                        <a:srgbClr val="E0E0E0"/>
-                      </a:solidFill>
-                      <a:prstDash val="solid"/>
-                      <a:round/>
-                      <a:headEnd type="none" w="med" len="med"/>
-                      <a:tailEnd type="none" w="med" len="med"/>
-                    </a:lnR>
-                    <a:lnT w="6350" cap="flat" cmpd="sng" algn="ctr">
-                      <a:solidFill>
-                        <a:srgbClr val="E0E0E0"/>
-                      </a:solidFill>
-                      <a:prstDash val="solid"/>
-                      <a:round/>
-                      <a:headEnd type="none" w="med" len="med"/>
-                      <a:tailEnd type="none" w="med" len="med"/>
-                    </a:lnT>
-                    <a:lnB w="6350" cap="flat" cmpd="sng" algn="ctr">
-                      <a:solidFill>
-                        <a:srgbClr val="E0E0E0"/>
-                      </a:solidFill>
-                      <a:prstDash val="solid"/>
-                      <a:round/>
-                      <a:headEnd type="none" w="med" len="med"/>
-                      <a:tailEnd type="none" w="med" len="med"/>
-                    </a:lnB>
-                  </a:tcPr>
-                </a:tc>
-                <a:tc>
-                  <a:txBody>
-                    <a:bodyPr/>
-                    <a:lstStyle/>
-                    <a:p>
-                      <a:pPr algn="ctr" indent="0" marL="0">
-                        <a:buNone/>
-                      </a:pPr>
-                      <a:r>
-                        <a:rPr lang="en-US" sz="1000" dirty="0">
+                      <a:endParaRPr lang="en-US" sz="900" dirty="0">
+                        <a:latin typeface="Meiryo UI" charset="0"/>
+                        <a:ea typeface="Meiryo UI" charset="0"/>
+                        <a:cs typeface="Meiryo UI" charset="0"/>
+                      </a:endParaRPr>
+                    </a:p>
+                    <a:p>
+                      <a:pPr algn="ctr" indent="0" marL="0">
+                        <a:buNone/>
+                      </a:pPr>
+                      <a:r>
+                        <a:rPr lang="en-US" sz="900" dirty="0">
                           <a:solidFill>
                             <a:srgbClr val="333333"/>
                           </a:solidFill>
@@ -11992,64 +12095,85 @@
                           <a:ea typeface="Meiryo UI" pitchFamily="34" charset="-122"/>
                           <a:cs typeface="Meiryo UI" pitchFamily="34" charset="-120"/>
                         </a:rPr>
+                        <a:t>(0/6件)</a:t>
+                      </a:r>
+                      <a:endParaRPr lang="en-US" sz="900" dirty="0">
+                        <a:latin typeface="Meiryo UI" charset="0"/>
+                        <a:ea typeface="Meiryo UI" charset="0"/>
+                        <a:cs typeface="Meiryo UI" charset="0"/>
+                      </a:endParaRPr>
+                    </a:p>
+                  </a:txBody>
+                  <a:tcPr marL="91440" marR="91440" marT="45720" marB="45720" anchor="ctr">
+                    <a:lnL w="6350" cap="flat" cmpd="sng" algn="ctr">
+                      <a:solidFill>
+                        <a:srgbClr val="E0E0E0"/>
+                      </a:solidFill>
+                      <a:prstDash val="solid"/>
+                      <a:round/>
+                      <a:headEnd type="none" w="med" len="med"/>
+                      <a:tailEnd type="none" w="med" len="med"/>
+                    </a:lnL>
+                    <a:lnR w="6350" cap="flat" cmpd="sng" algn="ctr">
+                      <a:solidFill>
+                        <a:srgbClr val="E0E0E0"/>
+                      </a:solidFill>
+                      <a:prstDash val="solid"/>
+                      <a:round/>
+                      <a:headEnd type="none" w="med" len="med"/>
+                      <a:tailEnd type="none" w="med" len="med"/>
+                    </a:lnR>
+                    <a:lnT w="6350" cap="flat" cmpd="sng" algn="ctr">
+                      <a:solidFill>
+                        <a:srgbClr val="E0E0E0"/>
+                      </a:solidFill>
+                      <a:prstDash val="solid"/>
+                      <a:round/>
+                      <a:headEnd type="none" w="med" len="med"/>
+                      <a:tailEnd type="none" w="med" len="med"/>
+                    </a:lnT>
+                    <a:lnB w="6350" cap="flat" cmpd="sng" algn="ctr">
+                      <a:solidFill>
+                        <a:srgbClr val="E0E0E0"/>
+                      </a:solidFill>
+                      <a:prstDash val="solid"/>
+                      <a:round/>
+                      <a:headEnd type="none" w="med" len="med"/>
+                      <a:tailEnd type="none" w="med" len="med"/>
+                    </a:lnB>
+                  </a:tcPr>
+                </a:tc>
+                <a:tc>
+                  <a:txBody>
+                    <a:bodyPr/>
+                    <a:lstStyle/>
+                    <a:p>
+                      <a:pPr algn="ctr" indent="0" marL="0">
+                        <a:buNone/>
+                      </a:pPr>
+                      <a:r>
+                        <a:rPr lang="en-US" sz="900" dirty="0">
+                          <a:solidFill>
+                            <a:srgbClr val="333333"/>
+                          </a:solidFill>
+                          <a:latin typeface="Meiryo UI" pitchFamily="34" charset="0"/>
+                          <a:ea typeface="Meiryo UI" pitchFamily="34" charset="-122"/>
+                          <a:cs typeface="Meiryo UI" pitchFamily="34" charset="-120"/>
+                        </a:rPr>
                         <a:t>4,274万</a:t>
                       </a:r>
-                      <a:endParaRPr lang="en-US" sz="1000" dirty="0">
-                        <a:latin typeface="Meiryo UI" charset="0"/>
-                        <a:ea typeface="Meiryo UI" charset="0"/>
-                        <a:cs typeface="Meiryo UI" charset="0"/>
-                      </a:endParaRPr>
-                    </a:p>
-                  </a:txBody>
-                  <a:tcPr marL="91440" marR="91440" marT="45720" marB="45720" anchor="ctr">
-                    <a:lnL w="6350" cap="flat" cmpd="sng" algn="ctr">
-                      <a:solidFill>
-                        <a:srgbClr val="E0E0E0"/>
-                      </a:solidFill>
-                      <a:prstDash val="solid"/>
-                      <a:round/>
-                      <a:headEnd type="none" w="med" len="med"/>
-                      <a:tailEnd type="none" w="med" len="med"/>
-                    </a:lnL>
-                    <a:lnR w="6350" cap="flat" cmpd="sng" algn="ctr">
-                      <a:solidFill>
-                        <a:srgbClr val="E0E0E0"/>
-                      </a:solidFill>
-                      <a:prstDash val="solid"/>
-                      <a:round/>
-                      <a:headEnd type="none" w="med" len="med"/>
-                      <a:tailEnd type="none" w="med" len="med"/>
-                    </a:lnR>
-                    <a:lnT w="6350" cap="flat" cmpd="sng" algn="ctr">
-                      <a:solidFill>
-                        <a:srgbClr val="E0E0E0"/>
-                      </a:solidFill>
-                      <a:prstDash val="solid"/>
-                      <a:round/>
-                      <a:headEnd type="none" w="med" len="med"/>
-                      <a:tailEnd type="none" w="med" len="med"/>
-                    </a:lnT>
-                    <a:lnB w="6350" cap="flat" cmpd="sng" algn="ctr">
-                      <a:solidFill>
-                        <a:srgbClr val="E0E0E0"/>
-                      </a:solidFill>
-                      <a:prstDash val="solid"/>
-                      <a:round/>
-                      <a:headEnd type="none" w="med" len="med"/>
-                      <a:tailEnd type="none" w="med" len="med"/>
-                    </a:lnB>
-                  </a:tcPr>
-                </a:tc>
-                <a:tc>
-                  <a:txBody>
-                    <a:bodyPr/>
-                    <a:lstStyle/>
-                    <a:p>
-                      <a:pPr algn="ctr" indent="0" marL="0">
-                        <a:buNone/>
-                      </a:pPr>
-                      <a:r>
-                        <a:rPr lang="en-US" sz="1000" dirty="0">
+                      <a:endParaRPr lang="en-US" sz="900" dirty="0">
+                        <a:latin typeface="Meiryo UI" charset="0"/>
+                        <a:ea typeface="Meiryo UI" charset="0"/>
+                        <a:cs typeface="Meiryo UI" charset="0"/>
+                      </a:endParaRPr>
+                    </a:p>
+                    <a:p>
+                      <a:pPr algn="ctr" indent="0" marL="0">
+                        <a:buNone/>
+                      </a:pPr>
+                      <a:r>
+                        <a:rPr lang="en-US" sz="900" dirty="0">
                           <a:solidFill>
                             <a:srgbClr val="333333"/>
                           </a:solidFill>
@@ -12057,64 +12181,85 @@
                           <a:ea typeface="Meiryo UI" pitchFamily="34" charset="-122"/>
                           <a:cs typeface="Meiryo UI" pitchFamily="34" charset="-120"/>
                         </a:rPr>
+                        <a:t>(7/12件)</a:t>
+                      </a:r>
+                      <a:endParaRPr lang="en-US" sz="900" dirty="0">
+                        <a:latin typeface="Meiryo UI" charset="0"/>
+                        <a:ea typeface="Meiryo UI" charset="0"/>
+                        <a:cs typeface="Meiryo UI" charset="0"/>
+                      </a:endParaRPr>
+                    </a:p>
+                  </a:txBody>
+                  <a:tcPr marL="91440" marR="91440" marT="45720" marB="45720" anchor="ctr">
+                    <a:lnL w="6350" cap="flat" cmpd="sng" algn="ctr">
+                      <a:solidFill>
+                        <a:srgbClr val="E0E0E0"/>
+                      </a:solidFill>
+                      <a:prstDash val="solid"/>
+                      <a:round/>
+                      <a:headEnd type="none" w="med" len="med"/>
+                      <a:tailEnd type="none" w="med" len="med"/>
+                    </a:lnL>
+                    <a:lnR w="6350" cap="flat" cmpd="sng" algn="ctr">
+                      <a:solidFill>
+                        <a:srgbClr val="E0E0E0"/>
+                      </a:solidFill>
+                      <a:prstDash val="solid"/>
+                      <a:round/>
+                      <a:headEnd type="none" w="med" len="med"/>
+                      <a:tailEnd type="none" w="med" len="med"/>
+                    </a:lnR>
+                    <a:lnT w="6350" cap="flat" cmpd="sng" algn="ctr">
+                      <a:solidFill>
+                        <a:srgbClr val="E0E0E0"/>
+                      </a:solidFill>
+                      <a:prstDash val="solid"/>
+                      <a:round/>
+                      <a:headEnd type="none" w="med" len="med"/>
+                      <a:tailEnd type="none" w="med" len="med"/>
+                    </a:lnT>
+                    <a:lnB w="6350" cap="flat" cmpd="sng" algn="ctr">
+                      <a:solidFill>
+                        <a:srgbClr val="E0E0E0"/>
+                      </a:solidFill>
+                      <a:prstDash val="solid"/>
+                      <a:round/>
+                      <a:headEnd type="none" w="med" len="med"/>
+                      <a:tailEnd type="none" w="med" len="med"/>
+                    </a:lnB>
+                  </a:tcPr>
+                </a:tc>
+                <a:tc>
+                  <a:txBody>
+                    <a:bodyPr/>
+                    <a:lstStyle/>
+                    <a:p>
+                      <a:pPr algn="ctr" indent="0" marL="0">
+                        <a:buNone/>
+                      </a:pPr>
+                      <a:r>
+                        <a:rPr lang="en-US" sz="900" dirty="0">
+                          <a:solidFill>
+                            <a:srgbClr val="333333"/>
+                          </a:solidFill>
+                          <a:latin typeface="Meiryo UI" pitchFamily="34" charset="0"/>
+                          <a:ea typeface="Meiryo UI" pitchFamily="34" charset="-122"/>
+                          <a:cs typeface="Meiryo UI" pitchFamily="34" charset="-120"/>
+                        </a:rPr>
                         <a:t>4.5億</a:t>
                       </a:r>
-                      <a:endParaRPr lang="en-US" sz="1000" dirty="0">
-                        <a:latin typeface="Meiryo UI" charset="0"/>
-                        <a:ea typeface="Meiryo UI" charset="0"/>
-                        <a:cs typeface="Meiryo UI" charset="0"/>
-                      </a:endParaRPr>
-                    </a:p>
-                  </a:txBody>
-                  <a:tcPr marL="91440" marR="91440" marT="45720" marB="45720" anchor="ctr">
-                    <a:lnL w="6350" cap="flat" cmpd="sng" algn="ctr">
-                      <a:solidFill>
-                        <a:srgbClr val="E0E0E0"/>
-                      </a:solidFill>
-                      <a:prstDash val="solid"/>
-                      <a:round/>
-                      <a:headEnd type="none" w="med" len="med"/>
-                      <a:tailEnd type="none" w="med" len="med"/>
-                    </a:lnL>
-                    <a:lnR w="6350" cap="flat" cmpd="sng" algn="ctr">
-                      <a:solidFill>
-                        <a:srgbClr val="E0E0E0"/>
-                      </a:solidFill>
-                      <a:prstDash val="solid"/>
-                      <a:round/>
-                      <a:headEnd type="none" w="med" len="med"/>
-                      <a:tailEnd type="none" w="med" len="med"/>
-                    </a:lnR>
-                    <a:lnT w="6350" cap="flat" cmpd="sng" algn="ctr">
-                      <a:solidFill>
-                        <a:srgbClr val="E0E0E0"/>
-                      </a:solidFill>
-                      <a:prstDash val="solid"/>
-                      <a:round/>
-                      <a:headEnd type="none" w="med" len="med"/>
-                      <a:tailEnd type="none" w="med" len="med"/>
-                    </a:lnT>
-                    <a:lnB w="6350" cap="flat" cmpd="sng" algn="ctr">
-                      <a:solidFill>
-                        <a:srgbClr val="E0E0E0"/>
-                      </a:solidFill>
-                      <a:prstDash val="solid"/>
-                      <a:round/>
-                      <a:headEnd type="none" w="med" len="med"/>
-                      <a:tailEnd type="none" w="med" len="med"/>
-                    </a:lnB>
-                  </a:tcPr>
-                </a:tc>
-                <a:tc>
-                  <a:txBody>
-                    <a:bodyPr/>
-                    <a:lstStyle/>
-                    <a:p>
-                      <a:pPr algn="ctr" indent="0" marL="0">
-                        <a:buNone/>
-                      </a:pPr>
-                      <a:r>
-                        <a:rPr lang="en-US" sz="1000" dirty="0">
+                      <a:endParaRPr lang="en-US" sz="900" dirty="0">
+                        <a:latin typeface="Meiryo UI" charset="0"/>
+                        <a:ea typeface="Meiryo UI" charset="0"/>
+                        <a:cs typeface="Meiryo UI" charset="0"/>
+                      </a:endParaRPr>
+                    </a:p>
+                    <a:p>
+                      <a:pPr algn="ctr" indent="0" marL="0">
+                        <a:buNone/>
+                      </a:pPr>
+                      <a:r>
+                        <a:rPr lang="en-US" sz="900" dirty="0">
                           <a:solidFill>
                             <a:srgbClr val="333333"/>
                           </a:solidFill>
@@ -12122,64 +12267,150 @@
                           <a:ea typeface="Meiryo UI" pitchFamily="34" charset="-122"/>
                           <a:cs typeface="Meiryo UI" pitchFamily="34" charset="-120"/>
                         </a:rPr>
+                        <a:t>(60/132件)</a:t>
+                      </a:r>
+                      <a:endParaRPr lang="en-US" sz="900" dirty="0">
+                        <a:latin typeface="Meiryo UI" charset="0"/>
+                        <a:ea typeface="Meiryo UI" charset="0"/>
+                        <a:cs typeface="Meiryo UI" charset="0"/>
+                      </a:endParaRPr>
+                    </a:p>
+                  </a:txBody>
+                  <a:tcPr marL="91440" marR="91440" marT="45720" marB="45720" anchor="ctr">
+                    <a:lnL w="6350" cap="flat" cmpd="sng" algn="ctr">
+                      <a:solidFill>
+                        <a:srgbClr val="E0E0E0"/>
+                      </a:solidFill>
+                      <a:prstDash val="solid"/>
+                      <a:round/>
+                      <a:headEnd type="none" w="med" len="med"/>
+                      <a:tailEnd type="none" w="med" len="med"/>
+                    </a:lnL>
+                    <a:lnR w="6350" cap="flat" cmpd="sng" algn="ctr">
+                      <a:solidFill>
+                        <a:srgbClr val="E0E0E0"/>
+                      </a:solidFill>
+                      <a:prstDash val="solid"/>
+                      <a:round/>
+                      <a:headEnd type="none" w="med" len="med"/>
+                      <a:tailEnd type="none" w="med" len="med"/>
+                    </a:lnR>
+                    <a:lnT w="6350" cap="flat" cmpd="sng" algn="ctr">
+                      <a:solidFill>
+                        <a:srgbClr val="E0E0E0"/>
+                      </a:solidFill>
+                      <a:prstDash val="solid"/>
+                      <a:round/>
+                      <a:headEnd type="none" w="med" len="med"/>
+                      <a:tailEnd type="none" w="med" len="med"/>
+                    </a:lnT>
+                    <a:lnB w="6350" cap="flat" cmpd="sng" algn="ctr">
+                      <a:solidFill>
+                        <a:srgbClr val="E0E0E0"/>
+                      </a:solidFill>
+                      <a:prstDash val="solid"/>
+                      <a:round/>
+                      <a:headEnd type="none" w="med" len="med"/>
+                      <a:tailEnd type="none" w="med" len="med"/>
+                    </a:lnB>
+                  </a:tcPr>
+                </a:tc>
+                <a:tc>
+                  <a:txBody>
+                    <a:bodyPr/>
+                    <a:lstStyle/>
+                    <a:p>
+                      <a:pPr algn="ctr" indent="0" marL="0">
+                        <a:buNone/>
+                      </a:pPr>
+                      <a:r>
+                        <a:rPr lang="en-US" sz="900" dirty="0">
+                          <a:solidFill>
+                            <a:srgbClr val="333333"/>
+                          </a:solidFill>
+                          <a:latin typeface="Meiryo UI" pitchFamily="34" charset="0"/>
+                          <a:ea typeface="Meiryo UI" pitchFamily="34" charset="-122"/>
+                          <a:cs typeface="Meiryo UI" pitchFamily="34" charset="-120"/>
+                        </a:rPr>
                         <a:t>4.6億</a:t>
                       </a:r>
-                      <a:endParaRPr lang="en-US" sz="1000" dirty="0">
-                        <a:latin typeface="Meiryo UI" charset="0"/>
-                        <a:ea typeface="Meiryo UI" charset="0"/>
-                        <a:cs typeface="Meiryo UI" charset="0"/>
-                      </a:endParaRPr>
-                    </a:p>
-                  </a:txBody>
-                  <a:tcPr marL="91440" marR="91440" marT="45720" marB="45720" anchor="ctr">
-                    <a:lnL w="6350" cap="flat" cmpd="sng" algn="ctr">
-                      <a:solidFill>
-                        <a:srgbClr val="E0E0E0"/>
-                      </a:solidFill>
-                      <a:prstDash val="solid"/>
-                      <a:round/>
-                      <a:headEnd type="none" w="med" len="med"/>
-                      <a:tailEnd type="none" w="med" len="med"/>
-                    </a:lnL>
-                    <a:lnR w="6350" cap="flat" cmpd="sng" algn="ctr">
-                      <a:solidFill>
-                        <a:srgbClr val="E0E0E0"/>
-                      </a:solidFill>
-                      <a:prstDash val="solid"/>
-                      <a:round/>
-                      <a:headEnd type="none" w="med" len="med"/>
-                      <a:tailEnd type="none" w="med" len="med"/>
-                    </a:lnR>
-                    <a:lnT w="6350" cap="flat" cmpd="sng" algn="ctr">
-                      <a:solidFill>
-                        <a:srgbClr val="E0E0E0"/>
-                      </a:solidFill>
-                      <a:prstDash val="solid"/>
-                      <a:round/>
-                      <a:headEnd type="none" w="med" len="med"/>
-                      <a:tailEnd type="none" w="med" len="med"/>
-                    </a:lnT>
-                    <a:lnB w="6350" cap="flat" cmpd="sng" algn="ctr">
-                      <a:solidFill>
-                        <a:srgbClr val="E0E0E0"/>
-                      </a:solidFill>
-                      <a:prstDash val="solid"/>
-                      <a:round/>
-                      <a:headEnd type="none" w="med" len="med"/>
-                      <a:tailEnd type="none" w="med" len="med"/>
-                    </a:lnB>
-                  </a:tcPr>
-                </a:tc>
-                <a:tc>
-                  <a:txBody>
-                    <a:bodyPr/>
-                    <a:lstStyle/>
-                    <a:p>
-                      <a:pPr algn="ctr" indent="0" marL="0">
-                        <a:buNone/>
-                      </a:pPr>
-                      <a:r>
-                        <a:rPr lang="en-US" sz="1000" b="1" dirty="0">
+                      <a:endParaRPr lang="en-US" sz="900" dirty="0">
+                        <a:latin typeface="Meiryo UI" charset="0"/>
+                        <a:ea typeface="Meiryo UI" charset="0"/>
+                        <a:cs typeface="Meiryo UI" charset="0"/>
+                      </a:endParaRPr>
+                    </a:p>
+                    <a:p>
+                      <a:pPr algn="ctr" indent="0" marL="0">
+                        <a:buNone/>
+                      </a:pPr>
+                      <a:r>
+                        <a:rPr lang="en-US" sz="900" dirty="0">
+                          <a:solidFill>
+                            <a:srgbClr val="333333"/>
+                          </a:solidFill>
+                          <a:latin typeface="Meiryo UI" pitchFamily="34" charset="0"/>
+                          <a:ea typeface="Meiryo UI" pitchFamily="34" charset="-122"/>
+                          <a:cs typeface="Meiryo UI" pitchFamily="34" charset="-120"/>
+                        </a:rPr>
+                        <a:t>(43/67件)</a:t>
+                      </a:r>
+                      <a:endParaRPr lang="en-US" sz="900" dirty="0">
+                        <a:latin typeface="Meiryo UI" charset="0"/>
+                        <a:ea typeface="Meiryo UI" charset="0"/>
+                        <a:cs typeface="Meiryo UI" charset="0"/>
+                      </a:endParaRPr>
+                    </a:p>
+                  </a:txBody>
+                  <a:tcPr marL="91440" marR="91440" marT="45720" marB="45720" anchor="ctr">
+                    <a:lnL w="6350" cap="flat" cmpd="sng" algn="ctr">
+                      <a:solidFill>
+                        <a:srgbClr val="E0E0E0"/>
+                      </a:solidFill>
+                      <a:prstDash val="solid"/>
+                      <a:round/>
+                      <a:headEnd type="none" w="med" len="med"/>
+                      <a:tailEnd type="none" w="med" len="med"/>
+                    </a:lnL>
+                    <a:lnR w="6350" cap="flat" cmpd="sng" algn="ctr">
+                      <a:solidFill>
+                        <a:srgbClr val="E0E0E0"/>
+                      </a:solidFill>
+                      <a:prstDash val="solid"/>
+                      <a:round/>
+                      <a:headEnd type="none" w="med" len="med"/>
+                      <a:tailEnd type="none" w="med" len="med"/>
+                    </a:lnR>
+                    <a:lnT w="6350" cap="flat" cmpd="sng" algn="ctr">
+                      <a:solidFill>
+                        <a:srgbClr val="E0E0E0"/>
+                      </a:solidFill>
+                      <a:prstDash val="solid"/>
+                      <a:round/>
+                      <a:headEnd type="none" w="med" len="med"/>
+                      <a:tailEnd type="none" w="med" len="med"/>
+                    </a:lnT>
+                    <a:lnB w="6350" cap="flat" cmpd="sng" algn="ctr">
+                      <a:solidFill>
+                        <a:srgbClr val="E0E0E0"/>
+                      </a:solidFill>
+                      <a:prstDash val="solid"/>
+                      <a:round/>
+                      <a:headEnd type="none" w="med" len="med"/>
+                      <a:tailEnd type="none" w="med" len="med"/>
+                    </a:lnB>
+                  </a:tcPr>
+                </a:tc>
+                <a:tc>
+                  <a:txBody>
+                    <a:bodyPr/>
+                    <a:lstStyle/>
+                    <a:p>
+                      <a:pPr algn="ctr" indent="0" marL="0">
+                        <a:buNone/>
+                      </a:pPr>
+                      <a:r>
+                        <a:rPr lang="en-US" sz="900" b="1" dirty="0">
                           <a:solidFill>
                             <a:srgbClr val="156082"/>
                           </a:solidFill>
@@ -12189,7 +12420,28 @@
                         </a:rPr>
                         <a:t>10.1億</a:t>
                       </a:r>
-                      <a:endParaRPr lang="en-US" sz="1000" dirty="0">
+                      <a:endParaRPr lang="en-US" sz="900" dirty="0">
+                        <a:latin typeface="Meiryo UI" charset="0"/>
+                        <a:ea typeface="Meiryo UI" charset="0"/>
+                        <a:cs typeface="Meiryo UI" charset="0"/>
+                      </a:endParaRPr>
+                    </a:p>
+                    <a:p>
+                      <a:pPr algn="ctr" indent="0" marL="0">
+                        <a:buNone/>
+                      </a:pPr>
+                      <a:r>
+                        <a:rPr lang="en-US" sz="900" b="1" dirty="0">
+                          <a:solidFill>
+                            <a:srgbClr val="156082"/>
+                          </a:solidFill>
+                          <a:latin typeface="Meiryo UI" pitchFamily="34" charset="0"/>
+                          <a:ea typeface="Meiryo UI" pitchFamily="34" charset="-122"/>
+                          <a:cs typeface="Meiryo UI" pitchFamily="34" charset="-120"/>
+                        </a:rPr>
+                        <a:t>(117/232件)</a:t>
+                      </a:r>
+                      <a:endParaRPr lang="en-US" sz="900" dirty="0">
                         <a:latin typeface="Meiryo UI" charset="0"/>
                         <a:ea typeface="Meiryo UI" charset="0"/>
                         <a:cs typeface="Meiryo UI" charset="0"/>
@@ -12317,7 +12569,7 @@
                         <a:buNone/>
                       </a:pPr>
                       <a:r>
-                        <a:rPr lang="en-US" sz="1000" b="1" dirty="0">
+                        <a:rPr lang="en-US" sz="900" b="1" dirty="0">
                           <a:solidFill>
                             <a:srgbClr val="156082"/>
                           </a:solidFill>
@@ -12327,7 +12579,28 @@
                         </a:rPr>
                         <a:t>8,834万</a:t>
                       </a:r>
-                      <a:endParaRPr lang="en-US" sz="1000" dirty="0">
+                      <a:endParaRPr lang="en-US" sz="900" dirty="0">
+                        <a:latin typeface="Meiryo UI" charset="0"/>
+                        <a:ea typeface="Meiryo UI" charset="0"/>
+                        <a:cs typeface="Meiryo UI" charset="0"/>
+                      </a:endParaRPr>
+                    </a:p>
+                    <a:p>
+                      <a:pPr algn="ctr" indent="0" marL="0">
+                        <a:buNone/>
+                      </a:pPr>
+                      <a:r>
+                        <a:rPr lang="en-US" sz="900" b="1" dirty="0">
+                          <a:solidFill>
+                            <a:srgbClr val="156082"/>
+                          </a:solidFill>
+                          <a:latin typeface="Meiryo UI" pitchFamily="34" charset="0"/>
+                          <a:ea typeface="Meiryo UI" pitchFamily="34" charset="-122"/>
+                          <a:cs typeface="Meiryo UI" pitchFamily="34" charset="-120"/>
+                        </a:rPr>
+                        <a:t>(10/18件)</a:t>
+                      </a:r>
+                      <a:endParaRPr lang="en-US" sz="900" dirty="0">
                         <a:latin typeface="Meiryo UI" charset="0"/>
                         <a:ea typeface="Meiryo UI" charset="0"/>
                         <a:cs typeface="Meiryo UI" charset="0"/>
@@ -12385,7 +12658,7 @@
                         <a:buNone/>
                       </a:pPr>
                       <a:r>
-                        <a:rPr lang="en-US" sz="1000" b="1" dirty="0">
+                        <a:rPr lang="en-US" sz="900" b="1" dirty="0">
                           <a:solidFill>
                             <a:srgbClr val="156082"/>
                           </a:solidFill>
@@ -12395,7 +12668,28 @@
                         </a:rPr>
                         <a:t>-</a:t>
                       </a:r>
-                      <a:endParaRPr lang="en-US" sz="1000" dirty="0">
+                      <a:endParaRPr lang="en-US" sz="900" dirty="0">
+                        <a:latin typeface="Meiryo UI" charset="0"/>
+                        <a:ea typeface="Meiryo UI" charset="0"/>
+                        <a:cs typeface="Meiryo UI" charset="0"/>
+                      </a:endParaRPr>
+                    </a:p>
+                    <a:p>
+                      <a:pPr algn="ctr" indent="0" marL="0">
+                        <a:buNone/>
+                      </a:pPr>
+                      <a:r>
+                        <a:rPr lang="en-US" sz="900" b="1" dirty="0">
+                          <a:solidFill>
+                            <a:srgbClr val="156082"/>
+                          </a:solidFill>
+                          <a:latin typeface="Meiryo UI" pitchFamily="34" charset="0"/>
+                          <a:ea typeface="Meiryo UI" pitchFamily="34" charset="-122"/>
+                          <a:cs typeface="Meiryo UI" pitchFamily="34" charset="-120"/>
+                        </a:rPr>
+                        <a:t>(0/8件)</a:t>
+                      </a:r>
+                      <a:endParaRPr lang="en-US" sz="900" dirty="0">
                         <a:latin typeface="Meiryo UI" charset="0"/>
                         <a:ea typeface="Meiryo UI" charset="0"/>
                         <a:cs typeface="Meiryo UI" charset="0"/>
@@ -12453,7 +12747,7 @@
                         <a:buNone/>
                       </a:pPr>
                       <a:r>
-                        <a:rPr lang="en-US" sz="1000" b="1" dirty="0">
+                        <a:rPr lang="en-US" sz="900" b="1" dirty="0">
                           <a:solidFill>
                             <a:srgbClr val="156082"/>
                           </a:solidFill>
@@ -12463,7 +12757,28 @@
                         </a:rPr>
                         <a:t>1,400万</a:t>
                       </a:r>
-                      <a:endParaRPr lang="en-US" sz="1000" dirty="0">
+                      <a:endParaRPr lang="en-US" sz="900" dirty="0">
+                        <a:latin typeface="Meiryo UI" charset="0"/>
+                        <a:ea typeface="Meiryo UI" charset="0"/>
+                        <a:cs typeface="Meiryo UI" charset="0"/>
+                      </a:endParaRPr>
+                    </a:p>
+                    <a:p>
+                      <a:pPr algn="ctr" indent="0" marL="0">
+                        <a:buNone/>
+                      </a:pPr>
+                      <a:r>
+                        <a:rPr lang="en-US" sz="900" b="1" dirty="0">
+                          <a:solidFill>
+                            <a:srgbClr val="156082"/>
+                          </a:solidFill>
+                          <a:latin typeface="Meiryo UI" pitchFamily="34" charset="0"/>
+                          <a:ea typeface="Meiryo UI" pitchFamily="34" charset="-122"/>
+                          <a:cs typeface="Meiryo UI" pitchFamily="34" charset="-120"/>
+                        </a:rPr>
+                        <a:t>(4/7件)</a:t>
+                      </a:r>
+                      <a:endParaRPr lang="en-US" sz="900" dirty="0">
                         <a:latin typeface="Meiryo UI" charset="0"/>
                         <a:ea typeface="Meiryo UI" charset="0"/>
                         <a:cs typeface="Meiryo UI" charset="0"/>
@@ -12521,7 +12836,7 @@
                         <a:buNone/>
                       </a:pPr>
                       <a:r>
-                        <a:rPr lang="en-US" sz="1000" b="1" dirty="0">
+                        <a:rPr lang="en-US" sz="900" b="1" dirty="0">
                           <a:solidFill>
                             <a:srgbClr val="156082"/>
                           </a:solidFill>
@@ -12531,7 +12846,28 @@
                         </a:rPr>
                         <a:t>2.0億</a:t>
                       </a:r>
-                      <a:endParaRPr lang="en-US" sz="1000" dirty="0">
+                      <a:endParaRPr lang="en-US" sz="900" dirty="0">
+                        <a:latin typeface="Meiryo UI" charset="0"/>
+                        <a:ea typeface="Meiryo UI" charset="0"/>
+                        <a:cs typeface="Meiryo UI" charset="0"/>
+                      </a:endParaRPr>
+                    </a:p>
+                    <a:p>
+                      <a:pPr algn="ctr" indent="0" marL="0">
+                        <a:buNone/>
+                      </a:pPr>
+                      <a:r>
+                        <a:rPr lang="en-US" sz="900" b="1" dirty="0">
+                          <a:solidFill>
+                            <a:srgbClr val="156082"/>
+                          </a:solidFill>
+                          <a:latin typeface="Meiryo UI" pitchFamily="34" charset="0"/>
+                          <a:ea typeface="Meiryo UI" pitchFamily="34" charset="-122"/>
+                          <a:cs typeface="Meiryo UI" pitchFamily="34" charset="-120"/>
+                        </a:rPr>
+                        <a:t>(44/130件)</a:t>
+                      </a:r>
+                      <a:endParaRPr lang="en-US" sz="900" dirty="0">
                         <a:latin typeface="Meiryo UI" charset="0"/>
                         <a:ea typeface="Meiryo UI" charset="0"/>
                         <a:cs typeface="Meiryo UI" charset="0"/>
@@ -12589,7 +12925,7 @@
                         <a:buNone/>
                       </a:pPr>
                       <a:r>
-                        <a:rPr lang="en-US" sz="1000" b="1" dirty="0">
+                        <a:rPr lang="en-US" sz="900" b="1" dirty="0">
                           <a:solidFill>
                             <a:srgbClr val="156082"/>
                           </a:solidFill>
@@ -12599,7 +12935,28 @@
                         </a:rPr>
                         <a:t>11.6億</a:t>
                       </a:r>
-                      <a:endParaRPr lang="en-US" sz="1000" dirty="0">
+                      <a:endParaRPr lang="en-US" sz="900" dirty="0">
+                        <a:latin typeface="Meiryo UI" charset="0"/>
+                        <a:ea typeface="Meiryo UI" charset="0"/>
+                        <a:cs typeface="Meiryo UI" charset="0"/>
+                      </a:endParaRPr>
+                    </a:p>
+                    <a:p>
+                      <a:pPr algn="ctr" indent="0" marL="0">
+                        <a:buNone/>
+                      </a:pPr>
+                      <a:r>
+                        <a:rPr lang="en-US" sz="900" b="1" dirty="0">
+                          <a:solidFill>
+                            <a:srgbClr val="156082"/>
+                          </a:solidFill>
+                          <a:latin typeface="Meiryo UI" pitchFamily="34" charset="0"/>
+                          <a:ea typeface="Meiryo UI" pitchFamily="34" charset="-122"/>
+                          <a:cs typeface="Meiryo UI" pitchFamily="34" charset="-120"/>
+                        </a:rPr>
+                        <a:t>(42/62件)</a:t>
+                      </a:r>
+                      <a:endParaRPr lang="en-US" sz="900" dirty="0">
                         <a:latin typeface="Meiryo UI" charset="0"/>
                         <a:ea typeface="Meiryo UI" charset="0"/>
                         <a:cs typeface="Meiryo UI" charset="0"/>
@@ -12657,7 +13014,7 @@
                         <a:buNone/>
                       </a:pPr>
                       <a:r>
-                        <a:rPr lang="en-US" sz="1000" b="1" dirty="0">
+                        <a:rPr lang="en-US" sz="900" b="1" dirty="0">
                           <a:solidFill>
                             <a:srgbClr val="156082"/>
                           </a:solidFill>
@@ -12667,7 +13024,28 @@
                         </a:rPr>
                         <a:t>14.6億</a:t>
                       </a:r>
-                      <a:endParaRPr lang="en-US" sz="1000" dirty="0">
+                      <a:endParaRPr lang="en-US" sz="900" dirty="0">
+                        <a:latin typeface="Meiryo UI" charset="0"/>
+                        <a:ea typeface="Meiryo UI" charset="0"/>
+                        <a:cs typeface="Meiryo UI" charset="0"/>
+                      </a:endParaRPr>
+                    </a:p>
+                    <a:p>
+                      <a:pPr algn="ctr" indent="0" marL="0">
+                        <a:buNone/>
+                      </a:pPr>
+                      <a:r>
+                        <a:rPr lang="en-US" sz="900" b="1" dirty="0">
+                          <a:solidFill>
+                            <a:srgbClr val="156082"/>
+                          </a:solidFill>
+                          <a:latin typeface="Meiryo UI" pitchFamily="34" charset="0"/>
+                          <a:ea typeface="Meiryo UI" pitchFamily="34" charset="-122"/>
+                          <a:cs typeface="Meiryo UI" pitchFamily="34" charset="-120"/>
+                        </a:rPr>
+                        <a:t>(100/225件)</a:t>
+                      </a:r>
+                      <a:endParaRPr lang="en-US" sz="900" dirty="0">
                         <a:latin typeface="Meiryo UI" charset="0"/>
                         <a:ea typeface="Meiryo UI" charset="0"/>
                         <a:cs typeface="Meiryo UI" charset="0"/>

</xml_diff>

<commit_message>
vault backup: 2026-02-17 15:24:57
</commit_message>
<xml_diff>
--- a/05_Output/Projects/@Active/NTTDX-Customer-Expansion-Mission/02-materials/FY2026-自治体生成AI案件-フェーズ別見通し.pptx
+++ b/05_Output/Projects/@Active/NTTDX-Customer-Expansion-Mission/02-materials/FY2026-自治体生成AI案件-フェーズ別見通し.pptx
@@ -13,9 +13,10 @@
     <p:sldId id="261" r:id="rId7"/>
     <p:sldId id="262" r:id="rId8"/>
     <p:sldId id="263" r:id="rId9"/>
+    <p:sldId id="264" r:id="rId10"/>
   </p:sldIdLst>
   <p:notesMasterIdLst>
-    <p:notesMasterId r:id="rId10"/>
+    <p:notesMasterId r:id="rId11"/>
   </p:notesMasterIdLst>
   <p:sldSz cx="9144000" cy="5143500"/>
   <p:notesSz cx="5143500" cy="9144000"/>
@@ -1149,6 +1150,94 @@
             <a:fld id="{F7021451-1387-4CA6-816F-3879F97B5CBC}" type="slidenum">
               <a:rPr lang="en-US"/>
               <a:t>8</a:t>
+            </a:fld>
+            <a:endParaRPr lang="en-US"/>
+          </a:p>
+        </p:txBody>
+      </p:sp>
+    </p:spTree>
+    <p:extLst>
+      <p:ext uri="{BB962C8B-B14F-4D97-AF65-F5344CB8AC3E}">
+        <p14:creationId xmlns:p14="http://schemas.microsoft.com/office/powerpoint/2010/main" val="1024086991"/>
+      </p:ext>
+    </p:extLst>
+  </p:cSld>
+  <p:clrMapOvr>
+    <a:masterClrMapping/>
+  </p:clrMapOvr>
+</p:notes>
+</file>
+
+<file path=ppt/notesSlides/notesSlide9.xml><?xml version="1.0" encoding="utf-8"?>
+<p:notes xmlns:a="http://schemas.openxmlformats.org/drawingml/2006/main" xmlns:r="http://schemas.openxmlformats.org/officeDocument/2006/relationships" xmlns:p="http://schemas.openxmlformats.org/presentationml/2006/main">
+  <p:cSld>
+    <p:spTree>
+      <p:nvGrpSpPr>
+        <p:cNvPr id="1" name=""/>
+        <p:cNvGrpSpPr/>
+        <p:nvPr/>
+      </p:nvGrpSpPr>
+      <p:grpSpPr>
+        <a:xfrm>
+          <a:off x="0" y="0"/>
+          <a:ext cx="0" cy="0"/>
+          <a:chOff x="0" y="0"/>
+          <a:chExt cx="0" cy="0"/>
+        </a:xfrm>
+      </p:grpSpPr>
+      <p:sp>
+        <p:nvSpPr>
+          <p:cNvPr id="2" name="Slide Image Placeholder 1"/>
+          <p:cNvSpPr>
+            <a:spLocks noGrp="1" noRot="1" noChangeAspect="1"/>
+          </p:cNvSpPr>
+          <p:nvPr>
+            <p:ph type="sldImg"/>
+          </p:nvPr>
+        </p:nvSpPr>
+        <p:spPr/>
+      </p:sp>
+      <p:sp>
+        <p:nvSpPr>
+          <p:cNvPr id="3" name="Notes Placeholder 2"/>
+          <p:cNvSpPr>
+            <a:spLocks noGrp="1"/>
+          </p:cNvSpPr>
+          <p:nvPr>
+            <p:ph type="body" idx="1"/>
+          </p:nvPr>
+        </p:nvSpPr>
+        <p:spPr/>
+        <p:txBody>
+          <a:bodyPr/>
+          <a:lstStyle/>
+          <a:p>
+            <a:r>
+              <a:rPr lang="en-US" dirty="0"/>
+              <a:t/>
+            </a:r>
+            <a:endParaRPr lang="en-US" dirty="0"/>
+          </a:p>
+        </p:txBody>
+      </p:sp>
+      <p:sp>
+        <p:nvSpPr>
+          <p:cNvPr id="4" name="Slide Number Placeholder 3"/>
+          <p:cNvSpPr>
+            <a:spLocks noGrp="1"/>
+          </p:cNvSpPr>
+          <p:nvPr>
+            <p:ph type="sldNum" sz="quarter" idx="10"/>
+          </p:nvPr>
+        </p:nvSpPr>
+        <p:spPr/>
+        <p:txBody>
+          <a:bodyPr/>
+          <a:lstStyle/>
+          <a:p>
+            <a:fld id="{F7021451-1387-4CA6-816F-3879F97B5CBC}" type="slidenum">
+              <a:rPr lang="en-US"/>
+              <a:t>9</a:t>
             </a:fld>
             <a:endParaRPr lang="en-US"/>
           </a:p>
@@ -28981,6 +29070,1679 @@
 <file path=ppt/slides/slide8.xml><?xml version="1.0" encoding="utf-8"?>
 <p:sld xmlns:a="http://schemas.openxmlformats.org/drawingml/2006/main" xmlns:r="http://schemas.openxmlformats.org/officeDocument/2006/relationships" xmlns:p="http://schemas.openxmlformats.org/presentationml/2006/main">
   <p:cSld name="Slide 8">
+    <p:bg>
+      <p:bgPr>
+        <a:blipFill dpi="0" rotWithShape="1">
+          <a:blip r:embed="rId1">
+            <a:lum/>
+          </a:blip>
+          <a:srcRect/>
+          <a:stretch>
+            <a:fillRect/>
+          </a:stretch>
+        </a:blipFill>
+        <a:effectLst/>
+      </p:bgPr>
+    </p:bg>
+    <p:spTree>
+      <p:nvGrpSpPr>
+        <p:cNvPr id="1" name=""/>
+        <p:cNvGrpSpPr/>
+        <p:nvPr/>
+      </p:nvGrpSpPr>
+      <p:grpSpPr>
+        <a:xfrm>
+          <a:off x="0" y="0"/>
+          <a:ext cx="0" cy="0"/>
+          <a:chOff x="0" y="0"/>
+          <a:chExt cx="0" cy="0"/>
+        </a:xfrm>
+      </p:grpSpPr>
+      <p:sp>
+        <p:nvSpPr>
+          <p:cNvPr id="2" name="Text 0"/>
+          <p:cNvSpPr/>
+          <p:nvPr/>
+        </p:nvSpPr>
+        <p:spPr>
+          <a:xfrm>
+            <a:off x="365760" y="228600"/>
+            <a:ext cx="7315200" cy="457200"/>
+          </a:xfrm>
+          <a:prstGeom prst="rect">
+            <a:avLst/>
+          </a:prstGeom>
+          <a:noFill/>
+          <a:ln/>
+        </p:spPr>
+        <p:txBody>
+          <a:bodyPr wrap="square" rtlCol="0" anchor="ctr"/>
+          <a:lstStyle/>
+          <a:p>
+            <a:pPr indent="0" marL="0">
+              <a:buNone/>
+            </a:pPr>
+            <a:r>
+              <a:rPr lang="en-US" sz="2400" b="1" dirty="0">
+                <a:solidFill>
+                  <a:srgbClr val="333333"/>
+                </a:solidFill>
+                <a:latin typeface="Meiryo UI" pitchFamily="34" charset="0"/>
+                <a:ea typeface="Meiryo UI" pitchFamily="34" charset="-122"/>
+                <a:cs typeface="Meiryo UI" pitchFamily="34" charset="-120"/>
+              </a:rPr>
+              <a:t>自治体案件 — 攻め方整理</a:t>
+            </a:r>
+            <a:endParaRPr lang="en-US" sz="2400" dirty="0"/>
+          </a:p>
+        </p:txBody>
+      </p:sp>
+      <p:sp>
+        <p:nvSpPr>
+          <p:cNvPr id="3" name="Shape 1"/>
+          <p:cNvSpPr/>
+          <p:nvPr/>
+        </p:nvSpPr>
+        <p:spPr>
+          <a:xfrm>
+            <a:off x="365760" y="685800"/>
+            <a:ext cx="8412480" cy="22860"/>
+          </a:xfrm>
+          <a:prstGeom prst="rect">
+            <a:avLst/>
+          </a:prstGeom>
+          <a:solidFill>
+            <a:srgbClr val="156082"/>
+          </a:solidFill>
+          <a:ln/>
+        </p:spPr>
+      </p:sp>
+      <p:sp>
+        <p:nvSpPr>
+          <p:cNvPr id="4" name="Text 2"/>
+          <p:cNvSpPr/>
+          <p:nvPr/>
+        </p:nvSpPr>
+        <p:spPr>
+          <a:xfrm>
+            <a:off x="365760" y="822960"/>
+            <a:ext cx="2743200" cy="274320"/>
+          </a:xfrm>
+          <a:prstGeom prst="rect">
+            <a:avLst/>
+          </a:prstGeom>
+          <a:noFill/>
+          <a:ln/>
+        </p:spPr>
+        <p:txBody>
+          <a:bodyPr wrap="square" rtlCol="0" anchor="ctr"/>
+          <a:lstStyle/>
+          <a:p>
+            <a:pPr indent="0" marL="0">
+              <a:buNone/>
+            </a:pPr>
+            <a:r>
+              <a:rPr lang="en-US" sz="1200" b="1" dirty="0">
+                <a:solidFill>
+                  <a:srgbClr val="156082"/>
+                </a:solidFill>
+                <a:latin typeface="Meiryo UI" pitchFamily="34" charset="0"/>
+                <a:ea typeface="Meiryo UI" pitchFamily="34" charset="-122"/>
+                <a:cs typeface="Meiryo UI" pitchFamily="34" charset="-120"/>
+              </a:rPr>
+              <a:t>獲得チャネル</a:t>
+            </a:r>
+            <a:endParaRPr lang="en-US" sz="1200" dirty="0"/>
+          </a:p>
+        </p:txBody>
+      </p:sp>
+      <p:sp>
+        <p:nvSpPr>
+          <p:cNvPr id="5" name="Shape 3"/>
+          <p:cNvSpPr/>
+          <p:nvPr/>
+        </p:nvSpPr>
+        <p:spPr>
+          <a:xfrm>
+            <a:off x="457200" y="1143000"/>
+            <a:ext cx="2651760" cy="2011680"/>
+          </a:xfrm>
+          <a:prstGeom prst="rect">
+            <a:avLst/>
+          </a:prstGeom>
+          <a:solidFill>
+            <a:srgbClr val="FFFFFF"/>
+          </a:solidFill>
+          <a:ln/>
+          <a:effectLst>
+            <a:outerShdw sx="100000" sy="100000" kx="0" ky="0" algn="bl" rotWithShape="0" blurRad="38100" dist="12700" dir="2700000">
+              <a:srgbClr val="000000">
+                <a:alpha val="15000"/>
+              </a:srgbClr>
+            </a:outerShdw>
+          </a:effectLst>
+        </p:spPr>
+      </p:sp>
+      <p:sp>
+        <p:nvSpPr>
+          <p:cNvPr id="6" name="Shape 4"/>
+          <p:cNvSpPr/>
+          <p:nvPr/>
+        </p:nvSpPr>
+        <p:spPr>
+          <a:xfrm>
+            <a:off x="457200" y="1143000"/>
+            <a:ext cx="2651760" cy="54864"/>
+          </a:xfrm>
+          <a:prstGeom prst="rect">
+            <a:avLst/>
+          </a:prstGeom>
+          <a:solidFill>
+            <a:srgbClr val="156082"/>
+          </a:solidFill>
+          <a:ln/>
+        </p:spPr>
+      </p:sp>
+      <p:sp>
+        <p:nvSpPr>
+          <p:cNvPr id="7" name="Text 5"/>
+          <p:cNvSpPr/>
+          <p:nvPr/>
+        </p:nvSpPr>
+        <p:spPr>
+          <a:xfrm>
+            <a:off x="594360" y="1280160"/>
+            <a:ext cx="2377440" cy="274320"/>
+          </a:xfrm>
+          <a:prstGeom prst="rect">
+            <a:avLst/>
+          </a:prstGeom>
+          <a:noFill/>
+          <a:ln/>
+        </p:spPr>
+        <p:txBody>
+          <a:bodyPr wrap="square" rtlCol="0" anchor="ctr"/>
+          <a:lstStyle/>
+          <a:p>
+            <a:pPr indent="0" marL="0">
+              <a:buNone/>
+            </a:pPr>
+            <a:r>
+              <a:rPr lang="en-US" sz="1300" b="1" dirty="0">
+                <a:solidFill>
+                  <a:srgbClr val="156082"/>
+                </a:solidFill>
+                <a:latin typeface="Meiryo UI" pitchFamily="34" charset="0"/>
+                <a:ea typeface="Meiryo UI" pitchFamily="34" charset="-122"/>
+                <a:cs typeface="Meiryo UI" pitchFamily="34" charset="-120"/>
+              </a:rPr>
+              <a:t>① 入札キング</a:t>
+            </a:r>
+            <a:endParaRPr lang="en-US" sz="1300" dirty="0"/>
+          </a:p>
+        </p:txBody>
+      </p:sp>
+      <p:sp>
+        <p:nvSpPr>
+          <p:cNvPr id="8" name="Text 6"/>
+          <p:cNvSpPr/>
+          <p:nvPr/>
+        </p:nvSpPr>
+        <p:spPr>
+          <a:xfrm>
+            <a:off x="594360" y="1508760"/>
+            <a:ext cx="2377440" cy="228600"/>
+          </a:xfrm>
+          <a:prstGeom prst="rect">
+            <a:avLst/>
+          </a:prstGeom>
+          <a:noFill/>
+          <a:ln/>
+        </p:spPr>
+        <p:txBody>
+          <a:bodyPr wrap="square" rtlCol="0" anchor="ctr"/>
+          <a:lstStyle/>
+          <a:p>
+            <a:pPr indent="0" marL="0">
+              <a:buNone/>
+            </a:pPr>
+            <a:r>
+              <a:rPr lang="en-US" sz="1100" dirty="0">
+                <a:solidFill>
+                  <a:srgbClr val="666666"/>
+                </a:solidFill>
+                <a:latin typeface="Meiryo UI" pitchFamily="34" charset="0"/>
+                <a:ea typeface="Meiryo UI" pitchFamily="34" charset="-122"/>
+                <a:cs typeface="Meiryo UI" pitchFamily="34" charset="-120"/>
+              </a:rPr>
+              <a:t>モニタリング</a:t>
+            </a:r>
+            <a:endParaRPr lang="en-US" sz="1100" dirty="0"/>
+          </a:p>
+        </p:txBody>
+      </p:sp>
+      <p:sp>
+        <p:nvSpPr>
+          <p:cNvPr id="9" name="Shape 7"/>
+          <p:cNvSpPr/>
+          <p:nvPr/>
+        </p:nvSpPr>
+        <p:spPr>
+          <a:xfrm>
+            <a:off x="594360" y="1783080"/>
+            <a:ext cx="2377440" cy="13716"/>
+          </a:xfrm>
+          <a:prstGeom prst="rect">
+            <a:avLst/>
+          </a:prstGeom>
+          <a:solidFill>
+            <a:srgbClr val="E0E0E0"/>
+          </a:solidFill>
+          <a:ln/>
+        </p:spPr>
+      </p:sp>
+      <p:sp>
+        <p:nvSpPr>
+          <p:cNvPr id="10" name="Text 8"/>
+          <p:cNvSpPr/>
+          <p:nvPr/>
+        </p:nvSpPr>
+        <p:spPr>
+          <a:xfrm>
+            <a:off x="594360" y="1828800"/>
+            <a:ext cx="2377440" cy="1188720"/>
+          </a:xfrm>
+          <a:prstGeom prst="rect">
+            <a:avLst/>
+          </a:prstGeom>
+          <a:noFill/>
+          <a:ln/>
+        </p:spPr>
+        <p:txBody>
+          <a:bodyPr wrap="square" rtlCol="0" anchor="t"/>
+          <a:lstStyle/>
+          <a:p>
+            <a:pPr indent="0" marL="0">
+              <a:lnSpc>
+                <a:spcPts val="1500"/>
+              </a:lnSpc>
+              <a:buNone/>
+            </a:pPr>
+            <a:r>
+              <a:rPr lang="en-US" sz="900" dirty="0">
+                <a:solidFill>
+                  <a:srgbClr val="333333"/>
+                </a:solidFill>
+                <a:latin typeface="Meiryo UI" pitchFamily="34" charset="0"/>
+                <a:ea typeface="Meiryo UI" pitchFamily="34" charset="-122"/>
+                <a:cs typeface="Meiryo UI" pitchFamily="34" charset="-120"/>
+              </a:rPr>
+              <a:t>• 公募案件の週次モニタリング</a:t>
+            </a:r>
+            <a:endParaRPr lang="en-US" sz="900" dirty="0"/>
+          </a:p>
+          <a:p>
+            <a:pPr indent="0" marL="0">
+              <a:lnSpc>
+                <a:spcPts val="1500"/>
+              </a:lnSpc>
+              <a:buNone/>
+            </a:pPr>
+            <a:r>
+              <a:rPr lang="en-US" sz="900" dirty="0">
+                <a:solidFill>
+                  <a:srgbClr val="333333"/>
+                </a:solidFill>
+                <a:latin typeface="Meiryo UI" pitchFamily="34" charset="0"/>
+                <a:ea typeface="Meiryo UI" pitchFamily="34" charset="-122"/>
+                <a:cs typeface="Meiryo UI" pitchFamily="34" charset="-120"/>
+              </a:rPr>
+              <a:t>• Medium帯(500万〜3000万)を全件チェック</a:t>
+            </a:r>
+            <a:endParaRPr lang="en-US" sz="900" dirty="0"/>
+          </a:p>
+          <a:p>
+            <a:pPr indent="0" marL="0">
+              <a:lnSpc>
+                <a:spcPts val="1500"/>
+              </a:lnSpc>
+              <a:buNone/>
+            </a:pPr>
+            <a:r>
+              <a:rPr lang="en-US" sz="900" dirty="0">
+                <a:solidFill>
+                  <a:srgbClr val="333333"/>
+                </a:solidFill>
+                <a:latin typeface="Meiryo UI" pitchFamily="34" charset="0"/>
+                <a:ea typeface="Meiryo UI" pitchFamily="34" charset="-122"/>
+                <a:cs typeface="Meiryo UI" pitchFamily="34" charset="-120"/>
+              </a:rPr>
+              <a:t>• 48.7%が1社応札</a:t>
+            </a:r>
+            <a:endParaRPr lang="en-US" sz="900" dirty="0"/>
+          </a:p>
+          <a:p>
+            <a:pPr indent="0" marL="0">
+              <a:lnSpc>
+                <a:spcPts val="1500"/>
+              </a:lnSpc>
+              <a:buNone/>
+            </a:pPr>
+            <a:r>
+              <a:rPr lang="en-US" sz="900" dirty="0">
+                <a:solidFill>
+                  <a:srgbClr val="333333"/>
+                </a:solidFill>
+                <a:latin typeface="Meiryo UI" pitchFamily="34" charset="0"/>
+                <a:ea typeface="Meiryo UI" pitchFamily="34" charset="-122"/>
+                <a:cs typeface="Meiryo UI" pitchFamily="34" charset="-120"/>
+              </a:rPr>
+              <a:t>  → 応札すれば勝てる案件が約半数</a:t>
+            </a:r>
+            <a:endParaRPr lang="en-US" sz="900" dirty="0"/>
+          </a:p>
+          <a:p>
+            <a:pPr indent="0" marL="0">
+              <a:lnSpc>
+                <a:spcPts val="1500"/>
+              </a:lnSpc>
+              <a:buNone/>
+            </a:pPr>
+            <a:r>
+              <a:rPr lang="en-US" sz="900" dirty="0">
+                <a:solidFill>
+                  <a:srgbClr val="333333"/>
+                </a:solidFill>
+                <a:latin typeface="Meiryo UI" pitchFamily="34" charset="0"/>
+                <a:ea typeface="Meiryo UI" pitchFamily="34" charset="-122"/>
+                <a:cs typeface="Meiryo UI" pitchFamily="34" charset="-120"/>
+              </a:rPr>
+              <a:t>• 対象: ④構築・⑤運用</a:t>
+            </a:r>
+            <a:endParaRPr lang="en-US" sz="900" dirty="0"/>
+          </a:p>
+        </p:txBody>
+      </p:sp>
+      <p:sp>
+        <p:nvSpPr>
+          <p:cNvPr id="11" name="Shape 9"/>
+          <p:cNvSpPr/>
+          <p:nvPr/>
+        </p:nvSpPr>
+        <p:spPr>
+          <a:xfrm>
+            <a:off x="3246120" y="1143000"/>
+            <a:ext cx="2651760" cy="2011680"/>
+          </a:xfrm>
+          <a:prstGeom prst="rect">
+            <a:avLst/>
+          </a:prstGeom>
+          <a:solidFill>
+            <a:srgbClr val="EDF7FA"/>
+          </a:solidFill>
+          <a:ln w="12700">
+            <a:solidFill>
+              <a:srgbClr val="156082"/>
+            </a:solidFill>
+            <a:prstDash val="solid"/>
+          </a:ln>
+        </p:spPr>
+      </p:sp>
+      <p:sp>
+        <p:nvSpPr>
+          <p:cNvPr id="12" name="Shape 10"/>
+          <p:cNvSpPr/>
+          <p:nvPr/>
+        </p:nvSpPr>
+        <p:spPr>
+          <a:xfrm>
+            <a:off x="3246120" y="1143000"/>
+            <a:ext cx="2651760" cy="54864"/>
+          </a:xfrm>
+          <a:prstGeom prst="rect">
+            <a:avLst/>
+          </a:prstGeom>
+          <a:solidFill>
+            <a:srgbClr val="156082"/>
+          </a:solidFill>
+          <a:ln/>
+        </p:spPr>
+      </p:sp>
+      <p:sp>
+        <p:nvSpPr>
+          <p:cNvPr id="13" name="Shape 11"/>
+          <p:cNvSpPr/>
+          <p:nvPr/>
+        </p:nvSpPr>
+        <p:spPr>
+          <a:xfrm>
+            <a:off x="4983480" y="1143000"/>
+            <a:ext cx="868680" cy="274320"/>
+          </a:xfrm>
+          <a:prstGeom prst="rect">
+            <a:avLst/>
+          </a:prstGeom>
+          <a:solidFill>
+            <a:srgbClr val="E67E22"/>
+          </a:solidFill>
+          <a:ln/>
+        </p:spPr>
+      </p:sp>
+      <p:sp>
+        <p:nvSpPr>
+          <p:cNvPr id="14" name="Text 12"/>
+          <p:cNvSpPr/>
+          <p:nvPr/>
+        </p:nvSpPr>
+        <p:spPr>
+          <a:xfrm>
+            <a:off x="4983480" y="1161288"/>
+            <a:ext cx="868680" cy="246888"/>
+          </a:xfrm>
+          <a:prstGeom prst="rect">
+            <a:avLst/>
+          </a:prstGeom>
+          <a:noFill/>
+          <a:ln/>
+        </p:spPr>
+        <p:txBody>
+          <a:bodyPr wrap="square" rtlCol="0" anchor="ctr"/>
+          <a:lstStyle/>
+          <a:p>
+            <a:pPr algn="ctr" indent="0" marL="0">
+              <a:buNone/>
+            </a:pPr>
+            <a:r>
+              <a:rPr lang="en-US" sz="1000" b="1" dirty="0">
+                <a:solidFill>
+                  <a:srgbClr val="FFFFFF"/>
+                </a:solidFill>
+                <a:latin typeface="Meiryo UI" pitchFamily="34" charset="0"/>
+                <a:ea typeface="Meiryo UI" pitchFamily="34" charset="-122"/>
+                <a:cs typeface="Meiryo UI" pitchFamily="34" charset="-120"/>
+              </a:rPr>
+              <a:t>メイン</a:t>
+            </a:r>
+            <a:endParaRPr lang="en-US" sz="1000" dirty="0"/>
+          </a:p>
+        </p:txBody>
+      </p:sp>
+      <p:sp>
+        <p:nvSpPr>
+          <p:cNvPr id="15" name="Text 13"/>
+          <p:cNvSpPr/>
+          <p:nvPr/>
+        </p:nvSpPr>
+        <p:spPr>
+          <a:xfrm>
+            <a:off x="3383280" y="1280160"/>
+            <a:ext cx="2377440" cy="274320"/>
+          </a:xfrm>
+          <a:prstGeom prst="rect">
+            <a:avLst/>
+          </a:prstGeom>
+          <a:noFill/>
+          <a:ln/>
+        </p:spPr>
+        <p:txBody>
+          <a:bodyPr wrap="square" rtlCol="0" anchor="ctr"/>
+          <a:lstStyle/>
+          <a:p>
+            <a:pPr indent="0" marL="0">
+              <a:buNone/>
+            </a:pPr>
+            <a:r>
+              <a:rPr lang="en-US" sz="1300" b="1" dirty="0">
+                <a:solidFill>
+                  <a:srgbClr val="156082"/>
+                </a:solidFill>
+                <a:latin typeface="Meiryo UI" pitchFamily="34" charset="0"/>
+                <a:ea typeface="Meiryo UI" pitchFamily="34" charset="-122"/>
+                <a:cs typeface="Meiryo UI" pitchFamily="34" charset="-120"/>
+              </a:rPr>
+              <a:t>② NTT東 支店ロビー</a:t>
+            </a:r>
+            <a:endParaRPr lang="en-US" sz="1300" dirty="0"/>
+          </a:p>
+        </p:txBody>
+      </p:sp>
+      <p:sp>
+        <p:nvSpPr>
+          <p:cNvPr id="16" name="Text 14"/>
+          <p:cNvSpPr/>
+          <p:nvPr/>
+        </p:nvSpPr>
+        <p:spPr>
+          <a:xfrm>
+            <a:off x="3383280" y="1508760"/>
+            <a:ext cx="2377440" cy="228600"/>
+          </a:xfrm>
+          <a:prstGeom prst="rect">
+            <a:avLst/>
+          </a:prstGeom>
+          <a:noFill/>
+          <a:ln/>
+        </p:spPr>
+        <p:txBody>
+          <a:bodyPr wrap="square" rtlCol="0" anchor="ctr"/>
+          <a:lstStyle/>
+          <a:p>
+            <a:pPr indent="0" marL="0">
+              <a:buNone/>
+            </a:pPr>
+            <a:r>
+              <a:rPr lang="en-US" sz="1100" dirty="0">
+                <a:solidFill>
+                  <a:srgbClr val="666666"/>
+                </a:solidFill>
+                <a:latin typeface="Meiryo UI" pitchFamily="34" charset="0"/>
+                <a:ea typeface="Meiryo UI" pitchFamily="34" charset="-122"/>
+                <a:cs typeface="Meiryo UI" pitchFamily="34" charset="-120"/>
+              </a:rPr>
+              <a:t>BI本部経由</a:t>
+            </a:r>
+            <a:endParaRPr lang="en-US" sz="1100" dirty="0"/>
+          </a:p>
+        </p:txBody>
+      </p:sp>
+      <p:sp>
+        <p:nvSpPr>
+          <p:cNvPr id="17" name="Shape 15"/>
+          <p:cNvSpPr/>
+          <p:nvPr/>
+        </p:nvSpPr>
+        <p:spPr>
+          <a:xfrm>
+            <a:off x="3383280" y="1783080"/>
+            <a:ext cx="2377440" cy="13716"/>
+          </a:xfrm>
+          <a:prstGeom prst="rect">
+            <a:avLst/>
+          </a:prstGeom>
+          <a:solidFill>
+            <a:srgbClr val="E0E0E0"/>
+          </a:solidFill>
+          <a:ln/>
+        </p:spPr>
+      </p:sp>
+      <p:sp>
+        <p:nvSpPr>
+          <p:cNvPr id="18" name="Text 16"/>
+          <p:cNvSpPr/>
+          <p:nvPr/>
+        </p:nvSpPr>
+        <p:spPr>
+          <a:xfrm>
+            <a:off x="3383280" y="1828800"/>
+            <a:ext cx="2377440" cy="1188720"/>
+          </a:xfrm>
+          <a:prstGeom prst="rect">
+            <a:avLst/>
+          </a:prstGeom>
+          <a:noFill/>
+          <a:ln/>
+        </p:spPr>
+        <p:txBody>
+          <a:bodyPr wrap="square" rtlCol="0" anchor="t"/>
+          <a:lstStyle/>
+          <a:p>
+            <a:pPr indent="0" marL="0">
+              <a:lnSpc>
+                <a:spcPts val="1500"/>
+              </a:lnSpc>
+              <a:buNone/>
+            </a:pPr>
+            <a:r>
+              <a:rPr lang="en-US" sz="900" dirty="0">
+                <a:solidFill>
+                  <a:srgbClr val="333333"/>
+                </a:solidFill>
+                <a:latin typeface="Meiryo UI" pitchFamily="34" charset="0"/>
+                <a:ea typeface="Meiryo UI" pitchFamily="34" charset="-122"/>
+                <a:cs typeface="Meiryo UI" pitchFamily="34" charset="-120"/>
+              </a:rPr>
+              <a:t>• BI本部にAI商材を打ち込み</a:t>
+            </a:r>
+            <a:endParaRPr lang="en-US" sz="900" dirty="0"/>
+          </a:p>
+          <a:p>
+            <a:pPr indent="0" marL="0">
+              <a:lnSpc>
+                <a:spcPts val="1500"/>
+              </a:lnSpc>
+              <a:buNone/>
+            </a:pPr>
+            <a:r>
+              <a:rPr lang="en-US" sz="900" dirty="0">
+                <a:solidFill>
+                  <a:srgbClr val="333333"/>
+                </a:solidFill>
+                <a:latin typeface="Meiryo UI" pitchFamily="34" charset="0"/>
+                <a:ea typeface="Meiryo UI" pitchFamily="34" charset="-122"/>
+                <a:cs typeface="Meiryo UI" pitchFamily="34" charset="-120"/>
+              </a:rPr>
+              <a:t>• 支店長勉強会でネタ提供</a:t>
+            </a:r>
+            <a:endParaRPr lang="en-US" sz="900" dirty="0"/>
+          </a:p>
+          <a:p>
+            <a:pPr indent="0" marL="0">
+              <a:lnSpc>
+                <a:spcPts val="1500"/>
+              </a:lnSpc>
+              <a:buNone/>
+            </a:pPr>
+            <a:r>
+              <a:rPr lang="en-US" sz="900" dirty="0">
+                <a:solidFill>
+                  <a:srgbClr val="333333"/>
+                </a:solidFill>
+                <a:latin typeface="Meiryo UI" pitchFamily="34" charset="0"/>
+                <a:ea typeface="Meiryo UI" pitchFamily="34" charset="-122"/>
+                <a:cs typeface="Meiryo UI" pitchFamily="34" charset="-120"/>
+              </a:rPr>
+              <a:t>  （井上さん主幹・ネタ募集中）</a:t>
+            </a:r>
+            <a:endParaRPr lang="en-US" sz="900" dirty="0"/>
+          </a:p>
+          <a:p>
+            <a:pPr indent="0" marL="0">
+              <a:lnSpc>
+                <a:spcPts val="1500"/>
+              </a:lnSpc>
+              <a:buNone/>
+            </a:pPr>
+            <a:r>
+              <a:rPr lang="en-US" sz="900" dirty="0">
+                <a:solidFill>
+                  <a:srgbClr val="333333"/>
+                </a:solidFill>
+                <a:latin typeface="Meiryo UI" pitchFamily="34" charset="0"/>
+                <a:ea typeface="Meiryo UI" pitchFamily="34" charset="-122"/>
+                <a:cs typeface="Meiryo UI" pitchFamily="34" charset="-120"/>
+              </a:rPr>
+              <a:t>• 支店営業から案件紹介を獲得</a:t>
+            </a:r>
+            <a:endParaRPr lang="en-US" sz="900" dirty="0"/>
+          </a:p>
+          <a:p>
+            <a:pPr indent="0" marL="0">
+              <a:lnSpc>
+                <a:spcPts val="1500"/>
+              </a:lnSpc>
+              <a:buNone/>
+            </a:pPr>
+            <a:r>
+              <a:rPr lang="en-US" sz="900" dirty="0">
+                <a:solidFill>
+                  <a:srgbClr val="333333"/>
+                </a:solidFill>
+                <a:latin typeface="Meiryo UI" pitchFamily="34" charset="0"/>
+                <a:ea typeface="Meiryo UI" pitchFamily="34" charset="-122"/>
+                <a:cs typeface="Meiryo UI" pitchFamily="34" charset="-120"/>
+              </a:rPr>
+              <a:t>• 対象: ①研修・③PoC → アップセル</a:t>
+            </a:r>
+            <a:endParaRPr lang="en-US" sz="900" dirty="0"/>
+          </a:p>
+        </p:txBody>
+      </p:sp>
+      <p:sp>
+        <p:nvSpPr>
+          <p:cNvPr id="19" name="Shape 17"/>
+          <p:cNvSpPr/>
+          <p:nvPr/>
+        </p:nvSpPr>
+        <p:spPr>
+          <a:xfrm>
+            <a:off x="6035040" y="1143000"/>
+            <a:ext cx="2651760" cy="2011680"/>
+          </a:xfrm>
+          <a:prstGeom prst="rect">
+            <a:avLst/>
+          </a:prstGeom>
+          <a:solidFill>
+            <a:srgbClr val="FFFFFF"/>
+          </a:solidFill>
+          <a:ln/>
+          <a:effectLst>
+            <a:outerShdw sx="100000" sy="100000" kx="0" ky="0" algn="bl" rotWithShape="0" blurRad="38100" dist="12700" dir="2700000">
+              <a:srgbClr val="000000">
+                <a:alpha val="15000"/>
+              </a:srgbClr>
+            </a:outerShdw>
+          </a:effectLst>
+        </p:spPr>
+      </p:sp>
+      <p:sp>
+        <p:nvSpPr>
+          <p:cNvPr id="20" name="Shape 18"/>
+          <p:cNvSpPr/>
+          <p:nvPr/>
+        </p:nvSpPr>
+        <p:spPr>
+          <a:xfrm>
+            <a:off x="6035040" y="1143000"/>
+            <a:ext cx="2651760" cy="54864"/>
+          </a:xfrm>
+          <a:prstGeom prst="rect">
+            <a:avLst/>
+          </a:prstGeom>
+          <a:solidFill>
+            <a:srgbClr val="156082"/>
+          </a:solidFill>
+          <a:ln/>
+        </p:spPr>
+      </p:sp>
+      <p:sp>
+        <p:nvSpPr>
+          <p:cNvPr id="21" name="Text 19"/>
+          <p:cNvSpPr/>
+          <p:nvPr/>
+        </p:nvSpPr>
+        <p:spPr>
+          <a:xfrm>
+            <a:off x="6172200" y="1280160"/>
+            <a:ext cx="2377440" cy="274320"/>
+          </a:xfrm>
+          <a:prstGeom prst="rect">
+            <a:avLst/>
+          </a:prstGeom>
+          <a:noFill/>
+          <a:ln/>
+        </p:spPr>
+        <p:txBody>
+          <a:bodyPr wrap="square" rtlCol="0" anchor="ctr"/>
+          <a:lstStyle/>
+          <a:p>
+            <a:pPr indent="0" marL="0">
+              <a:buNone/>
+            </a:pPr>
+            <a:r>
+              <a:rPr lang="en-US" sz="1300" b="1" dirty="0">
+                <a:solidFill>
+                  <a:srgbClr val="156082"/>
+                </a:solidFill>
+                <a:latin typeface="Meiryo UI" pitchFamily="34" charset="0"/>
+                <a:ea typeface="Meiryo UI" pitchFamily="34" charset="-122"/>
+                <a:cs typeface="Meiryo UI" pitchFamily="34" charset="-120"/>
+              </a:rPr>
+              <a:t>③ 直接アプローチ</a:t>
+            </a:r>
+            <a:endParaRPr lang="en-US" sz="1300" dirty="0"/>
+          </a:p>
+        </p:txBody>
+      </p:sp>
+      <p:sp>
+        <p:nvSpPr>
+          <p:cNvPr id="22" name="Text 20"/>
+          <p:cNvSpPr/>
+          <p:nvPr/>
+        </p:nvSpPr>
+        <p:spPr>
+          <a:xfrm>
+            <a:off x="6172200" y="1508760"/>
+            <a:ext cx="2377440" cy="228600"/>
+          </a:xfrm>
+          <a:prstGeom prst="rect">
+            <a:avLst/>
+          </a:prstGeom>
+          <a:noFill/>
+          <a:ln/>
+        </p:spPr>
+        <p:txBody>
+          <a:bodyPr wrap="square" rtlCol="0" anchor="ctr"/>
+          <a:lstStyle/>
+          <a:p>
+            <a:pPr indent="0" marL="0">
+              <a:buNone/>
+            </a:pPr>
+            <a:r>
+              <a:rPr lang="en-US" sz="1100" dirty="0">
+                <a:solidFill>
+                  <a:srgbClr val="666666"/>
+                </a:solidFill>
+                <a:latin typeface="Meiryo UI" pitchFamily="34" charset="0"/>
+                <a:ea typeface="Meiryo UI" pitchFamily="34" charset="-122"/>
+                <a:cs typeface="Meiryo UI" pitchFamily="34" charset="-120"/>
+              </a:rPr>
+              <a:t>不調案件・既存顧客</a:t>
+            </a:r>
+            <a:endParaRPr lang="en-US" sz="1100" dirty="0"/>
+          </a:p>
+        </p:txBody>
+      </p:sp>
+      <p:sp>
+        <p:nvSpPr>
+          <p:cNvPr id="23" name="Shape 21"/>
+          <p:cNvSpPr/>
+          <p:nvPr/>
+        </p:nvSpPr>
+        <p:spPr>
+          <a:xfrm>
+            <a:off x="6172200" y="1783080"/>
+            <a:ext cx="2377440" cy="13716"/>
+          </a:xfrm>
+          <a:prstGeom prst="rect">
+            <a:avLst/>
+          </a:prstGeom>
+          <a:solidFill>
+            <a:srgbClr val="E0E0E0"/>
+          </a:solidFill>
+          <a:ln/>
+        </p:spPr>
+      </p:sp>
+      <p:sp>
+        <p:nvSpPr>
+          <p:cNvPr id="24" name="Text 22"/>
+          <p:cNvSpPr/>
+          <p:nvPr/>
+        </p:nvSpPr>
+        <p:spPr>
+          <a:xfrm>
+            <a:off x="6172200" y="1828800"/>
+            <a:ext cx="2377440" cy="1188720"/>
+          </a:xfrm>
+          <a:prstGeom prst="rect">
+            <a:avLst/>
+          </a:prstGeom>
+          <a:noFill/>
+          <a:ln/>
+        </p:spPr>
+        <p:txBody>
+          <a:bodyPr wrap="square" rtlCol="0" anchor="t"/>
+          <a:lstStyle/>
+          <a:p>
+            <a:pPr indent="0" marL="0">
+              <a:lnSpc>
+                <a:spcPts val="1500"/>
+              </a:lnSpc>
+              <a:buNone/>
+            </a:pPr>
+            <a:r>
+              <a:rPr lang="en-US" sz="900" dirty="0">
+                <a:solidFill>
+                  <a:srgbClr val="333333"/>
+                </a:solidFill>
+                <a:latin typeface="Meiryo UI" pitchFamily="34" charset="0"/>
+                <a:ea typeface="Meiryo UI" pitchFamily="34" charset="-122"/>
+                <a:cs typeface="Meiryo UI" pitchFamily="34" charset="-120"/>
+              </a:rPr>
+              <a:t>• 入札不調案件の再公募対応</a:t>
+            </a:r>
+            <a:endParaRPr lang="en-US" sz="900" dirty="0"/>
+          </a:p>
+          <a:p>
+            <a:pPr indent="0" marL="0">
+              <a:lnSpc>
+                <a:spcPts val="1500"/>
+              </a:lnSpc>
+              <a:buNone/>
+            </a:pPr>
+            <a:r>
+              <a:rPr lang="en-US" sz="900" dirty="0">
+                <a:solidFill>
+                  <a:srgbClr val="333333"/>
+                </a:solidFill>
+                <a:latin typeface="Meiryo UI" pitchFamily="34" charset="0"/>
+                <a:ea typeface="Meiryo UI" pitchFamily="34" charset="-122"/>
+                <a:cs typeface="Meiryo UI" pitchFamily="34" charset="-120"/>
+              </a:rPr>
+              <a:t>  （例: 岡山市）</a:t>
+            </a:r>
+            <a:endParaRPr lang="en-US" sz="900" dirty="0"/>
+          </a:p>
+          <a:p>
+            <a:pPr indent="0" marL="0">
+              <a:lnSpc>
+                <a:spcPts val="1500"/>
+              </a:lnSpc>
+              <a:buNone/>
+            </a:pPr>
+            <a:r>
+              <a:rPr lang="en-US" sz="900" dirty="0">
+                <a:solidFill>
+                  <a:srgbClr val="333333"/>
+                </a:solidFill>
+                <a:latin typeface="Meiryo UI" pitchFamily="34" charset="0"/>
+                <a:ea typeface="Meiryo UI" pitchFamily="34" charset="-122"/>
+                <a:cs typeface="Meiryo UI" pitchFamily="34" charset="-120"/>
+              </a:rPr>
+              <a:t>• NTT東既存自治体顧客への</a:t>
+            </a:r>
+            <a:endParaRPr lang="en-US" sz="900" dirty="0"/>
+          </a:p>
+          <a:p>
+            <a:pPr indent="0" marL="0">
+              <a:lnSpc>
+                <a:spcPts val="1500"/>
+              </a:lnSpc>
+              <a:buNone/>
+            </a:pPr>
+            <a:r>
+              <a:rPr lang="en-US" sz="900" dirty="0">
+                <a:solidFill>
+                  <a:srgbClr val="333333"/>
+                </a:solidFill>
+                <a:latin typeface="Meiryo UI" pitchFamily="34" charset="0"/>
+                <a:ea typeface="Meiryo UI" pitchFamily="34" charset="-122"/>
+                <a:cs typeface="Meiryo UI" pitchFamily="34" charset="-120"/>
+              </a:rPr>
+              <a:t>  直接提案（千葉県・北海道型）</a:t>
+            </a:r>
+            <a:endParaRPr lang="en-US" sz="900" dirty="0"/>
+          </a:p>
+          <a:p>
+            <a:pPr indent="0" marL="0">
+              <a:lnSpc>
+                <a:spcPts val="1500"/>
+              </a:lnSpc>
+              <a:buNone/>
+            </a:pPr>
+            <a:r>
+              <a:rPr lang="en-US" sz="900" dirty="0">
+                <a:solidFill>
+                  <a:srgbClr val="333333"/>
+                </a:solidFill>
+                <a:latin typeface="Meiryo UI" pitchFamily="34" charset="0"/>
+                <a:ea typeface="Meiryo UI" pitchFamily="34" charset="-122"/>
+                <a:cs typeface="Meiryo UI" pitchFamily="34" charset="-120"/>
+              </a:rPr>
+              <a:t>• 対象: ④構築・⑤運用</a:t>
+            </a:r>
+            <a:endParaRPr lang="en-US" sz="900" dirty="0"/>
+          </a:p>
+        </p:txBody>
+      </p:sp>
+      <p:sp>
+        <p:nvSpPr>
+          <p:cNvPr id="25" name="Text 23"/>
+          <p:cNvSpPr/>
+          <p:nvPr/>
+        </p:nvSpPr>
+        <p:spPr>
+          <a:xfrm>
+            <a:off x="365760" y="3291840"/>
+            <a:ext cx="4572000" cy="274320"/>
+          </a:xfrm>
+          <a:prstGeom prst="rect">
+            <a:avLst/>
+          </a:prstGeom>
+          <a:noFill/>
+          <a:ln/>
+        </p:spPr>
+        <p:txBody>
+          <a:bodyPr wrap="square" rtlCol="0" anchor="ctr"/>
+          <a:lstStyle/>
+          <a:p>
+            <a:pPr indent="0" marL="0">
+              <a:buNone/>
+            </a:pPr>
+            <a:r>
+              <a:rPr lang="en-US" sz="1200" b="1" dirty="0">
+                <a:solidFill>
+                  <a:srgbClr val="333333"/>
+                </a:solidFill>
+                <a:latin typeface="Meiryo UI" pitchFamily="34" charset="0"/>
+                <a:ea typeface="Meiryo UI" pitchFamily="34" charset="-122"/>
+                <a:cs typeface="Meiryo UI" pitchFamily="34" charset="-120"/>
+              </a:rPr>
+              <a:t>支店ロビー活動 タイムライン</a:t>
+            </a:r>
+            <a:endParaRPr lang="en-US" sz="1200" dirty="0"/>
+          </a:p>
+        </p:txBody>
+      </p:sp>
+      <p:sp>
+        <p:nvSpPr>
+          <p:cNvPr id="26" name="Shape 24"/>
+          <p:cNvSpPr/>
+          <p:nvPr/>
+        </p:nvSpPr>
+        <p:spPr>
+          <a:xfrm>
+            <a:off x="457200" y="3611880"/>
+            <a:ext cx="2651760" cy="1234440"/>
+          </a:xfrm>
+          <a:prstGeom prst="roundRect">
+            <a:avLst>
+              <a:gd name="adj" fmla="val 3704"/>
+            </a:avLst>
+          </a:prstGeom>
+          <a:solidFill>
+            <a:srgbClr val="F8F9FA"/>
+          </a:solidFill>
+          <a:ln w="12700">
+            <a:solidFill>
+              <a:srgbClr val="E0E0E0"/>
+            </a:solidFill>
+            <a:prstDash val="solid"/>
+          </a:ln>
+        </p:spPr>
+      </p:sp>
+      <p:sp>
+        <p:nvSpPr>
+          <p:cNvPr id="27" name="Text 25"/>
+          <p:cNvSpPr/>
+          <p:nvPr/>
+        </p:nvSpPr>
+        <p:spPr>
+          <a:xfrm>
+            <a:off x="548640" y="3657600"/>
+            <a:ext cx="2468880" cy="274320"/>
+          </a:xfrm>
+          <a:prstGeom prst="rect">
+            <a:avLst/>
+          </a:prstGeom>
+          <a:noFill/>
+          <a:ln/>
+        </p:spPr>
+        <p:txBody>
+          <a:bodyPr wrap="square" rtlCol="0" anchor="ctr"/>
+          <a:lstStyle/>
+          <a:p>
+            <a:pPr indent="0" marL="0">
+              <a:buNone/>
+            </a:pPr>
+            <a:r>
+              <a:rPr lang="en-US" sz="1300" b="1" dirty="0">
+                <a:solidFill>
+                  <a:srgbClr val="333333"/>
+                </a:solidFill>
+                <a:latin typeface="Meiryo UI" pitchFamily="34" charset="0"/>
+                <a:ea typeface="Meiryo UI" pitchFamily="34" charset="-122"/>
+                <a:cs typeface="Meiryo UI" pitchFamily="34" charset="-120"/>
+              </a:rPr>
+              <a:t>3月</a:t>
+            </a:r>
+            <a:endParaRPr lang="en-US" sz="1300" dirty="0"/>
+          </a:p>
+        </p:txBody>
+      </p:sp>
+      <p:sp>
+        <p:nvSpPr>
+          <p:cNvPr id="28" name="Text 26"/>
+          <p:cNvSpPr/>
+          <p:nvPr/>
+        </p:nvSpPr>
+        <p:spPr>
+          <a:xfrm>
+            <a:off x="548640" y="3931920"/>
+            <a:ext cx="2468880" cy="228600"/>
+          </a:xfrm>
+          <a:prstGeom prst="rect">
+            <a:avLst/>
+          </a:prstGeom>
+          <a:noFill/>
+          <a:ln/>
+        </p:spPr>
+        <p:txBody>
+          <a:bodyPr wrap="square" rtlCol="0" anchor="ctr"/>
+          <a:lstStyle/>
+          <a:p>
+            <a:pPr indent="0" marL="0">
+              <a:buNone/>
+            </a:pPr>
+            <a:r>
+              <a:rPr lang="en-US" sz="1000" b="1" dirty="0">
+                <a:solidFill>
+                  <a:srgbClr val="666666"/>
+                </a:solidFill>
+                <a:latin typeface="Meiryo UI" pitchFamily="34" charset="0"/>
+                <a:ea typeface="Meiryo UI" pitchFamily="34" charset="-122"/>
+                <a:cs typeface="Meiryo UI" pitchFamily="34" charset="-120"/>
+              </a:rPr>
+              <a:t>ロビー活動開始</a:t>
+            </a:r>
+            <a:endParaRPr lang="en-US" sz="1000" dirty="0"/>
+          </a:p>
+        </p:txBody>
+      </p:sp>
+      <p:sp>
+        <p:nvSpPr>
+          <p:cNvPr id="29" name="Shape 27"/>
+          <p:cNvSpPr/>
+          <p:nvPr/>
+        </p:nvSpPr>
+        <p:spPr>
+          <a:xfrm>
+            <a:off x="548640" y="4187952"/>
+            <a:ext cx="2468880" cy="10973"/>
+          </a:xfrm>
+          <a:prstGeom prst="rect">
+            <a:avLst/>
+          </a:prstGeom>
+          <a:solidFill>
+            <a:srgbClr val="E0E0E0"/>
+          </a:solidFill>
+          <a:ln/>
+        </p:spPr>
+      </p:sp>
+      <p:sp>
+        <p:nvSpPr>
+          <p:cNvPr id="30" name="Text 28"/>
+          <p:cNvSpPr/>
+          <p:nvPr/>
+        </p:nvSpPr>
+        <p:spPr>
+          <a:xfrm>
+            <a:off x="548640" y="4224528"/>
+            <a:ext cx="2468880" cy="548640"/>
+          </a:xfrm>
+          <a:prstGeom prst="rect">
+            <a:avLst/>
+          </a:prstGeom>
+          <a:noFill/>
+          <a:ln/>
+        </p:spPr>
+        <p:txBody>
+          <a:bodyPr wrap="square" rtlCol="0" anchor="t"/>
+          <a:lstStyle/>
+          <a:p>
+            <a:pPr indent="0" marL="0">
+              <a:lnSpc>
+                <a:spcPts val="1500"/>
+              </a:lnSpc>
+              <a:buNone/>
+            </a:pPr>
+            <a:r>
+              <a:rPr lang="en-US" sz="900" dirty="0">
+                <a:solidFill>
+                  <a:srgbClr val="333333"/>
+                </a:solidFill>
+                <a:latin typeface="Meiryo UI" pitchFamily="34" charset="0"/>
+                <a:ea typeface="Meiryo UI" pitchFamily="34" charset="-122"/>
+                <a:cs typeface="Meiryo UI" pitchFamily="34" charset="-120"/>
+              </a:rPr>
+              <a:t>BI本部へ商材打ち込み</a:t>
+            </a:r>
+            <a:endParaRPr lang="en-US" sz="900" dirty="0"/>
+          </a:p>
+          <a:p>
+            <a:pPr indent="0" marL="0">
+              <a:lnSpc>
+                <a:spcPts val="1500"/>
+              </a:lnSpc>
+              <a:buNone/>
+            </a:pPr>
+            <a:r>
+              <a:rPr lang="en-US" sz="900" dirty="0">
+                <a:solidFill>
+                  <a:srgbClr val="333333"/>
+                </a:solidFill>
+                <a:latin typeface="Meiryo UI" pitchFamily="34" charset="0"/>
+                <a:ea typeface="Meiryo UI" pitchFamily="34" charset="-122"/>
+                <a:cs typeface="Meiryo UI" pitchFamily="34" charset="-120"/>
+              </a:rPr>
+              <a:t>井上さんへコンタクト</a:t>
+            </a:r>
+            <a:endParaRPr lang="en-US" sz="900" dirty="0"/>
+          </a:p>
+        </p:txBody>
+      </p:sp>
+      <p:sp>
+        <p:nvSpPr>
+          <p:cNvPr id="31" name="Text 29"/>
+          <p:cNvSpPr/>
+          <p:nvPr/>
+        </p:nvSpPr>
+        <p:spPr>
+          <a:xfrm>
+            <a:off x="3063240" y="3931920"/>
+            <a:ext cx="274320" cy="365760"/>
+          </a:xfrm>
+          <a:prstGeom prst="rect">
+            <a:avLst/>
+          </a:prstGeom>
+          <a:noFill/>
+          <a:ln/>
+        </p:spPr>
+        <p:txBody>
+          <a:bodyPr wrap="square" rtlCol="0" anchor="ctr"/>
+          <a:lstStyle/>
+          <a:p>
+            <a:pPr algn="ctr" indent="0" marL="0">
+              <a:buNone/>
+            </a:pPr>
+            <a:r>
+              <a:rPr lang="en-US" sz="1800" dirty="0">
+                <a:solidFill>
+                  <a:srgbClr val="156082"/>
+                </a:solidFill>
+                <a:latin typeface="Meiryo UI" pitchFamily="34" charset="0"/>
+                <a:ea typeface="Meiryo UI" pitchFamily="34" charset="-122"/>
+                <a:cs typeface="Meiryo UI" pitchFamily="34" charset="-120"/>
+              </a:rPr>
+              <a:t>→</a:t>
+            </a:r>
+            <a:endParaRPr lang="en-US" sz="1800" dirty="0"/>
+          </a:p>
+        </p:txBody>
+      </p:sp>
+      <p:sp>
+        <p:nvSpPr>
+          <p:cNvPr id="32" name="Shape 30"/>
+          <p:cNvSpPr/>
+          <p:nvPr/>
+        </p:nvSpPr>
+        <p:spPr>
+          <a:xfrm>
+            <a:off x="3291840" y="3611880"/>
+            <a:ext cx="2651760" cy="1234440"/>
+          </a:xfrm>
+          <a:prstGeom prst="roundRect">
+            <a:avLst>
+              <a:gd name="adj" fmla="val 3704"/>
+            </a:avLst>
+          </a:prstGeom>
+          <a:solidFill>
+            <a:srgbClr val="EDF7FA"/>
+          </a:solidFill>
+          <a:ln w="12700">
+            <a:solidFill>
+              <a:srgbClr val="156082"/>
+            </a:solidFill>
+            <a:prstDash val="solid"/>
+          </a:ln>
+        </p:spPr>
+      </p:sp>
+      <p:sp>
+        <p:nvSpPr>
+          <p:cNvPr id="33" name="Text 31"/>
+          <p:cNvSpPr/>
+          <p:nvPr/>
+        </p:nvSpPr>
+        <p:spPr>
+          <a:xfrm>
+            <a:off x="3383280" y="3657600"/>
+            <a:ext cx="2468880" cy="274320"/>
+          </a:xfrm>
+          <a:prstGeom prst="rect">
+            <a:avLst/>
+          </a:prstGeom>
+          <a:noFill/>
+          <a:ln/>
+        </p:spPr>
+        <p:txBody>
+          <a:bodyPr wrap="square" rtlCol="0" anchor="ctr"/>
+          <a:lstStyle/>
+          <a:p>
+            <a:pPr indent="0" marL="0">
+              <a:buNone/>
+            </a:pPr>
+            <a:r>
+              <a:rPr lang="en-US" sz="1300" b="1" dirty="0">
+                <a:solidFill>
+                  <a:srgbClr val="156082"/>
+                </a:solidFill>
+                <a:latin typeface="Meiryo UI" pitchFamily="34" charset="0"/>
+                <a:ea typeface="Meiryo UI" pitchFamily="34" charset="-122"/>
+                <a:cs typeface="Meiryo UI" pitchFamily="34" charset="-120"/>
+              </a:rPr>
+              <a:t>4月（メイン）</a:t>
+            </a:r>
+            <a:endParaRPr lang="en-US" sz="1300" dirty="0"/>
+          </a:p>
+        </p:txBody>
+      </p:sp>
+      <p:sp>
+        <p:nvSpPr>
+          <p:cNvPr id="34" name="Text 32"/>
+          <p:cNvSpPr/>
+          <p:nvPr/>
+        </p:nvSpPr>
+        <p:spPr>
+          <a:xfrm>
+            <a:off x="3383280" y="3931920"/>
+            <a:ext cx="2468880" cy="228600"/>
+          </a:xfrm>
+          <a:prstGeom prst="rect">
+            <a:avLst/>
+          </a:prstGeom>
+          <a:noFill/>
+          <a:ln/>
+        </p:spPr>
+        <p:txBody>
+          <a:bodyPr wrap="square" rtlCol="0" anchor="ctr"/>
+          <a:lstStyle/>
+          <a:p>
+            <a:pPr indent="0" marL="0">
+              <a:buNone/>
+            </a:pPr>
+            <a:r>
+              <a:rPr lang="en-US" sz="1000" b="1" dirty="0">
+                <a:solidFill>
+                  <a:srgbClr val="666666"/>
+                </a:solidFill>
+                <a:latin typeface="Meiryo UI" pitchFamily="34" charset="0"/>
+                <a:ea typeface="Meiryo UI" pitchFamily="34" charset="-122"/>
+                <a:cs typeface="Meiryo UI" pitchFamily="34" charset="-120"/>
+              </a:rPr>
+              <a:t>支店展開</a:t>
+            </a:r>
+            <a:endParaRPr lang="en-US" sz="1000" dirty="0"/>
+          </a:p>
+        </p:txBody>
+      </p:sp>
+      <p:sp>
+        <p:nvSpPr>
+          <p:cNvPr id="35" name="Shape 33"/>
+          <p:cNvSpPr/>
+          <p:nvPr/>
+        </p:nvSpPr>
+        <p:spPr>
+          <a:xfrm>
+            <a:off x="3383280" y="4187952"/>
+            <a:ext cx="2468880" cy="10973"/>
+          </a:xfrm>
+          <a:prstGeom prst="rect">
+            <a:avLst/>
+          </a:prstGeom>
+          <a:solidFill>
+            <a:srgbClr val="E0E0E0"/>
+          </a:solidFill>
+          <a:ln/>
+        </p:spPr>
+      </p:sp>
+      <p:sp>
+        <p:nvSpPr>
+          <p:cNvPr id="36" name="Text 34"/>
+          <p:cNvSpPr/>
+          <p:nvPr/>
+        </p:nvSpPr>
+        <p:spPr>
+          <a:xfrm>
+            <a:off x="3383280" y="4224528"/>
+            <a:ext cx="2468880" cy="548640"/>
+          </a:xfrm>
+          <a:prstGeom prst="rect">
+            <a:avLst/>
+          </a:prstGeom>
+          <a:noFill/>
+          <a:ln/>
+        </p:spPr>
+        <p:txBody>
+          <a:bodyPr wrap="square" rtlCol="0" anchor="t"/>
+          <a:lstStyle/>
+          <a:p>
+            <a:pPr indent="0" marL="0">
+              <a:lnSpc>
+                <a:spcPts val="1500"/>
+              </a:lnSpc>
+              <a:buNone/>
+            </a:pPr>
+            <a:r>
+              <a:rPr lang="en-US" sz="900" dirty="0">
+                <a:solidFill>
+                  <a:srgbClr val="333333"/>
+                </a:solidFill>
+                <a:latin typeface="Meiryo UI" pitchFamily="34" charset="0"/>
+                <a:ea typeface="Meiryo UI" pitchFamily="34" charset="-122"/>
+                <a:cs typeface="Meiryo UI" pitchFamily="34" charset="-120"/>
+              </a:rPr>
+              <a:t>支店長勉強会で発表</a:t>
+            </a:r>
+            <a:endParaRPr lang="en-US" sz="900" dirty="0"/>
+          </a:p>
+          <a:p>
+            <a:pPr indent="0" marL="0">
+              <a:lnSpc>
+                <a:spcPts val="1500"/>
+              </a:lnSpc>
+              <a:buNone/>
+            </a:pPr>
+            <a:r>
+              <a:rPr lang="en-US" sz="900" dirty="0">
+                <a:solidFill>
+                  <a:srgbClr val="333333"/>
+                </a:solidFill>
+                <a:latin typeface="Meiryo UI" pitchFamily="34" charset="0"/>
+                <a:ea typeface="Meiryo UI" pitchFamily="34" charset="-122"/>
+                <a:cs typeface="Meiryo UI" pitchFamily="34" charset="-120"/>
+              </a:rPr>
+              <a:t>案件発見チェックリスト配布</a:t>
+            </a:r>
+            <a:endParaRPr lang="en-US" sz="900" dirty="0"/>
+          </a:p>
+        </p:txBody>
+      </p:sp>
+      <p:sp>
+        <p:nvSpPr>
+          <p:cNvPr id="37" name="Text 35"/>
+          <p:cNvSpPr/>
+          <p:nvPr/>
+        </p:nvSpPr>
+        <p:spPr>
+          <a:xfrm>
+            <a:off x="5897880" y="3931920"/>
+            <a:ext cx="274320" cy="365760"/>
+          </a:xfrm>
+          <a:prstGeom prst="rect">
+            <a:avLst/>
+          </a:prstGeom>
+          <a:noFill/>
+          <a:ln/>
+        </p:spPr>
+        <p:txBody>
+          <a:bodyPr wrap="square" rtlCol="0" anchor="ctr"/>
+          <a:lstStyle/>
+          <a:p>
+            <a:pPr algn="ctr" indent="0" marL="0">
+              <a:buNone/>
+            </a:pPr>
+            <a:r>
+              <a:rPr lang="en-US" sz="1800" dirty="0">
+                <a:solidFill>
+                  <a:srgbClr val="156082"/>
+                </a:solidFill>
+                <a:latin typeface="Meiryo UI" pitchFamily="34" charset="0"/>
+                <a:ea typeface="Meiryo UI" pitchFamily="34" charset="-122"/>
+                <a:cs typeface="Meiryo UI" pitchFamily="34" charset="-120"/>
+              </a:rPr>
+              <a:t>→</a:t>
+            </a:r>
+            <a:endParaRPr lang="en-US" sz="1800" dirty="0"/>
+          </a:p>
+        </p:txBody>
+      </p:sp>
+      <p:sp>
+        <p:nvSpPr>
+          <p:cNvPr id="38" name="Shape 36"/>
+          <p:cNvSpPr/>
+          <p:nvPr/>
+        </p:nvSpPr>
+        <p:spPr>
+          <a:xfrm>
+            <a:off x="6126480" y="3611880"/>
+            <a:ext cx="2651760" cy="1234440"/>
+          </a:xfrm>
+          <a:prstGeom prst="roundRect">
+            <a:avLst>
+              <a:gd name="adj" fmla="val 3704"/>
+            </a:avLst>
+          </a:prstGeom>
+          <a:solidFill>
+            <a:srgbClr val="F8F9FA"/>
+          </a:solidFill>
+          <a:ln w="12700">
+            <a:solidFill>
+              <a:srgbClr val="E0E0E0"/>
+            </a:solidFill>
+            <a:prstDash val="solid"/>
+          </a:ln>
+        </p:spPr>
+      </p:sp>
+      <p:sp>
+        <p:nvSpPr>
+          <p:cNvPr id="39" name="Text 37"/>
+          <p:cNvSpPr/>
+          <p:nvPr/>
+        </p:nvSpPr>
+        <p:spPr>
+          <a:xfrm>
+            <a:off x="6217920" y="3657600"/>
+            <a:ext cx="2468880" cy="274320"/>
+          </a:xfrm>
+          <a:prstGeom prst="rect">
+            <a:avLst/>
+          </a:prstGeom>
+          <a:noFill/>
+          <a:ln/>
+        </p:spPr>
+        <p:txBody>
+          <a:bodyPr wrap="square" rtlCol="0" anchor="ctr"/>
+          <a:lstStyle/>
+          <a:p>
+            <a:pPr indent="0" marL="0">
+              <a:buNone/>
+            </a:pPr>
+            <a:r>
+              <a:rPr lang="en-US" sz="1300" b="1" dirty="0">
+                <a:solidFill>
+                  <a:srgbClr val="333333"/>
+                </a:solidFill>
+                <a:latin typeface="Meiryo UI" pitchFamily="34" charset="0"/>
+                <a:ea typeface="Meiryo UI" pitchFamily="34" charset="-122"/>
+                <a:cs typeface="Meiryo UI" pitchFamily="34" charset="-120"/>
+              </a:rPr>
+              <a:t>5月〜</a:t>
+            </a:r>
+            <a:endParaRPr lang="en-US" sz="1300" dirty="0"/>
+          </a:p>
+        </p:txBody>
+      </p:sp>
+      <p:sp>
+        <p:nvSpPr>
+          <p:cNvPr id="40" name="Text 38"/>
+          <p:cNvSpPr/>
+          <p:nvPr/>
+        </p:nvSpPr>
+        <p:spPr>
+          <a:xfrm>
+            <a:off x="6217920" y="3931920"/>
+            <a:ext cx="2468880" cy="228600"/>
+          </a:xfrm>
+          <a:prstGeom prst="rect">
+            <a:avLst/>
+          </a:prstGeom>
+          <a:noFill/>
+          <a:ln/>
+        </p:spPr>
+        <p:txBody>
+          <a:bodyPr wrap="square" rtlCol="0" anchor="ctr"/>
+          <a:lstStyle/>
+          <a:p>
+            <a:pPr indent="0" marL="0">
+              <a:buNone/>
+            </a:pPr>
+            <a:r>
+              <a:rPr lang="en-US" sz="1000" b="1" dirty="0">
+                <a:solidFill>
+                  <a:srgbClr val="666666"/>
+                </a:solidFill>
+                <a:latin typeface="Meiryo UI" pitchFamily="34" charset="0"/>
+                <a:ea typeface="Meiryo UI" pitchFamily="34" charset="-122"/>
+                <a:cs typeface="Meiryo UI" pitchFamily="34" charset="-120"/>
+              </a:rPr>
+              <a:t>案件紹介開始</a:t>
+            </a:r>
+            <a:endParaRPr lang="en-US" sz="1000" dirty="0"/>
+          </a:p>
+        </p:txBody>
+      </p:sp>
+      <p:sp>
+        <p:nvSpPr>
+          <p:cNvPr id="41" name="Shape 39"/>
+          <p:cNvSpPr/>
+          <p:nvPr/>
+        </p:nvSpPr>
+        <p:spPr>
+          <a:xfrm>
+            <a:off x="6217920" y="4187952"/>
+            <a:ext cx="2468880" cy="10973"/>
+          </a:xfrm>
+          <a:prstGeom prst="rect">
+            <a:avLst/>
+          </a:prstGeom>
+          <a:solidFill>
+            <a:srgbClr val="E0E0E0"/>
+          </a:solidFill>
+          <a:ln/>
+        </p:spPr>
+      </p:sp>
+      <p:sp>
+        <p:nvSpPr>
+          <p:cNvPr id="42" name="Text 40"/>
+          <p:cNvSpPr/>
+          <p:nvPr/>
+        </p:nvSpPr>
+        <p:spPr>
+          <a:xfrm>
+            <a:off x="6217920" y="4224528"/>
+            <a:ext cx="2468880" cy="548640"/>
+          </a:xfrm>
+          <a:prstGeom prst="rect">
+            <a:avLst/>
+          </a:prstGeom>
+          <a:noFill/>
+          <a:ln/>
+        </p:spPr>
+        <p:txBody>
+          <a:bodyPr wrap="square" rtlCol="0" anchor="t"/>
+          <a:lstStyle/>
+          <a:p>
+            <a:pPr indent="0" marL="0">
+              <a:lnSpc>
+                <a:spcPts val="1500"/>
+              </a:lnSpc>
+              <a:buNone/>
+            </a:pPr>
+            <a:r>
+              <a:rPr lang="en-US" sz="900" dirty="0">
+                <a:solidFill>
+                  <a:srgbClr val="333333"/>
+                </a:solidFill>
+                <a:latin typeface="Meiryo UI" pitchFamily="34" charset="0"/>
+                <a:ea typeface="Meiryo UI" pitchFamily="34" charset="-122"/>
+                <a:cs typeface="Meiryo UI" pitchFamily="34" charset="-120"/>
+              </a:rPr>
+              <a:t>支店営業から案件紹介</a:t>
+            </a:r>
+            <a:endParaRPr lang="en-US" sz="900" dirty="0"/>
+          </a:p>
+          <a:p>
+            <a:pPr indent="0" marL="0">
+              <a:lnSpc>
+                <a:spcPts val="1500"/>
+              </a:lnSpc>
+              <a:buNone/>
+            </a:pPr>
+            <a:r>
+              <a:rPr lang="en-US" sz="900" dirty="0">
+                <a:solidFill>
+                  <a:srgbClr val="333333"/>
+                </a:solidFill>
+                <a:latin typeface="Meiryo UI" pitchFamily="34" charset="0"/>
+                <a:ea typeface="Meiryo UI" pitchFamily="34" charset="-122"/>
+                <a:cs typeface="Meiryo UI" pitchFamily="34" charset="-120"/>
+              </a:rPr>
+              <a:t>自治体新年度予算執行</a:t>
+            </a:r>
+            <a:endParaRPr lang="en-US" sz="900" dirty="0"/>
+          </a:p>
+        </p:txBody>
+      </p:sp>
+    </p:spTree>
+  </p:cSld>
+  <p:clrMapOvr>
+    <a:masterClrMapping/>
+  </p:clrMapOvr>
+</p:sld>
+</file>
+
+<file path=ppt/slides/slide9.xml><?xml version="1.0" encoding="utf-8"?>
+<p:sld xmlns:a="http://schemas.openxmlformats.org/drawingml/2006/main" xmlns:r="http://schemas.openxmlformats.org/officeDocument/2006/relationships" xmlns:p="http://schemas.openxmlformats.org/presentationml/2006/main">
+  <p:cSld name="Slide 9">
     <p:spTree>
       <p:nvGrpSpPr>
         <p:cNvPr id="1" name=""/>

</xml_diff>